<commit_message>
Update NLP Text pre-processing techniques.pptx
</commit_message>
<xml_diff>
--- a/6 - Naive Bayes/NLP Text pre-processing techniques.pptx
+++ b/6 - Naive Bayes/NLP Text pre-processing techniques.pptx
@@ -5,7 +5,7 @@
     <p:sldMasterId id="2147483648" r:id="rId4"/>
   </p:sldMasterIdLst>
   <p:notesMasterIdLst>
-    <p:notesMasterId r:id="rId34"/>
+    <p:notesMasterId r:id="rId35"/>
   </p:notesMasterIdLst>
   <p:sldIdLst>
     <p:sldId id="257" r:id="rId5"/>
@@ -13,30 +13,31 @@
     <p:sldId id="326" r:id="rId7"/>
     <p:sldId id="327" r:id="rId8"/>
     <p:sldId id="328" r:id="rId9"/>
-    <p:sldId id="329" r:id="rId10"/>
-    <p:sldId id="332" r:id="rId11"/>
-    <p:sldId id="330" r:id="rId12"/>
-    <p:sldId id="331" r:id="rId13"/>
-    <p:sldId id="333" r:id="rId14"/>
-    <p:sldId id="334" r:id="rId15"/>
-    <p:sldId id="340" r:id="rId16"/>
-    <p:sldId id="335" r:id="rId17"/>
-    <p:sldId id="342" r:id="rId18"/>
-    <p:sldId id="336" r:id="rId19"/>
-    <p:sldId id="348" r:id="rId20"/>
-    <p:sldId id="337" r:id="rId21"/>
-    <p:sldId id="338" r:id="rId22"/>
-    <p:sldId id="341" r:id="rId23"/>
-    <p:sldId id="339" r:id="rId24"/>
-    <p:sldId id="346" r:id="rId25"/>
-    <p:sldId id="345" r:id="rId26"/>
-    <p:sldId id="344" r:id="rId27"/>
-    <p:sldId id="349" r:id="rId28"/>
-    <p:sldId id="347" r:id="rId29"/>
-    <p:sldId id="350" r:id="rId30"/>
-    <p:sldId id="351" r:id="rId31"/>
-    <p:sldId id="352" r:id="rId32"/>
-    <p:sldId id="353" r:id="rId33"/>
+    <p:sldId id="354" r:id="rId10"/>
+    <p:sldId id="329" r:id="rId11"/>
+    <p:sldId id="332" r:id="rId12"/>
+    <p:sldId id="330" r:id="rId13"/>
+    <p:sldId id="331" r:id="rId14"/>
+    <p:sldId id="333" r:id="rId15"/>
+    <p:sldId id="334" r:id="rId16"/>
+    <p:sldId id="340" r:id="rId17"/>
+    <p:sldId id="335" r:id="rId18"/>
+    <p:sldId id="342" r:id="rId19"/>
+    <p:sldId id="336" r:id="rId20"/>
+    <p:sldId id="348" r:id="rId21"/>
+    <p:sldId id="337" r:id="rId22"/>
+    <p:sldId id="338" r:id="rId23"/>
+    <p:sldId id="341" r:id="rId24"/>
+    <p:sldId id="339" r:id="rId25"/>
+    <p:sldId id="346" r:id="rId26"/>
+    <p:sldId id="345" r:id="rId27"/>
+    <p:sldId id="344" r:id="rId28"/>
+    <p:sldId id="349" r:id="rId29"/>
+    <p:sldId id="347" r:id="rId30"/>
+    <p:sldId id="350" r:id="rId31"/>
+    <p:sldId id="351" r:id="rId32"/>
+    <p:sldId id="352" r:id="rId33"/>
+    <p:sldId id="353" r:id="rId34"/>
   </p:sldIdLst>
   <p:sldSz cx="12192000" cy="6858000"/>
   <p:notesSz cx="6858000" cy="9144000"/>
@@ -659,7 +660,7 @@
     </p:spTree>
     <p:extLst>
       <p:ext uri="{BB962C8B-B14F-4D97-AF65-F5344CB8AC3E}">
-        <p14:creationId xmlns:p14="http://schemas.microsoft.com/office/powerpoint/2010/main" val="2626100771"/>
+        <p14:creationId xmlns:p14="http://schemas.microsoft.com/office/powerpoint/2010/main" val="1944665232"/>
       </p:ext>
     </p:extLst>
   </p:cSld>
@@ -743,7 +744,7 @@
     </p:spTree>
     <p:extLst>
       <p:ext uri="{BB962C8B-B14F-4D97-AF65-F5344CB8AC3E}">
-        <p14:creationId xmlns:p14="http://schemas.microsoft.com/office/powerpoint/2010/main" val="3378213011"/>
+        <p14:creationId xmlns:p14="http://schemas.microsoft.com/office/powerpoint/2010/main" val="2626100771"/>
       </p:ext>
     </p:extLst>
   </p:cSld>
@@ -827,7 +828,7 @@
     </p:spTree>
     <p:extLst>
       <p:ext uri="{BB962C8B-B14F-4D97-AF65-F5344CB8AC3E}">
-        <p14:creationId xmlns:p14="http://schemas.microsoft.com/office/powerpoint/2010/main" val="1905091078"/>
+        <p14:creationId xmlns:p14="http://schemas.microsoft.com/office/powerpoint/2010/main" val="3378213011"/>
       </p:ext>
     </p:extLst>
   </p:cSld>
@@ -911,7 +912,7 @@
     </p:spTree>
     <p:extLst>
       <p:ext uri="{BB962C8B-B14F-4D97-AF65-F5344CB8AC3E}">
-        <p14:creationId xmlns:p14="http://schemas.microsoft.com/office/powerpoint/2010/main" val="1170491486"/>
+        <p14:creationId xmlns:p14="http://schemas.microsoft.com/office/powerpoint/2010/main" val="1905091078"/>
       </p:ext>
     </p:extLst>
   </p:cSld>
@@ -995,7 +996,7 @@
     </p:spTree>
     <p:extLst>
       <p:ext uri="{BB962C8B-B14F-4D97-AF65-F5344CB8AC3E}">
-        <p14:creationId xmlns:p14="http://schemas.microsoft.com/office/powerpoint/2010/main" val="4250832242"/>
+        <p14:creationId xmlns:p14="http://schemas.microsoft.com/office/powerpoint/2010/main" val="1170491486"/>
       </p:ext>
     </p:extLst>
   </p:cSld>
@@ -1079,7 +1080,7 @@
     </p:spTree>
     <p:extLst>
       <p:ext uri="{BB962C8B-B14F-4D97-AF65-F5344CB8AC3E}">
-        <p14:creationId xmlns:p14="http://schemas.microsoft.com/office/powerpoint/2010/main" val="4242513626"/>
+        <p14:creationId xmlns:p14="http://schemas.microsoft.com/office/powerpoint/2010/main" val="4250832242"/>
       </p:ext>
     </p:extLst>
   </p:cSld>
@@ -1163,7 +1164,7 @@
     </p:spTree>
     <p:extLst>
       <p:ext uri="{BB962C8B-B14F-4D97-AF65-F5344CB8AC3E}">
-        <p14:creationId xmlns:p14="http://schemas.microsoft.com/office/powerpoint/2010/main" val="3270296631"/>
+        <p14:creationId xmlns:p14="http://schemas.microsoft.com/office/powerpoint/2010/main" val="4242513626"/>
       </p:ext>
     </p:extLst>
   </p:cSld>
@@ -1247,7 +1248,7 @@
     </p:spTree>
     <p:extLst>
       <p:ext uri="{BB962C8B-B14F-4D97-AF65-F5344CB8AC3E}">
-        <p14:creationId xmlns:p14="http://schemas.microsoft.com/office/powerpoint/2010/main" val="298003715"/>
+        <p14:creationId xmlns:p14="http://schemas.microsoft.com/office/powerpoint/2010/main" val="3270296631"/>
       </p:ext>
     </p:extLst>
   </p:cSld>
@@ -1331,7 +1332,7 @@
     </p:spTree>
     <p:extLst>
       <p:ext uri="{BB962C8B-B14F-4D97-AF65-F5344CB8AC3E}">
-        <p14:creationId xmlns:p14="http://schemas.microsoft.com/office/powerpoint/2010/main" val="3334544210"/>
+        <p14:creationId xmlns:p14="http://schemas.microsoft.com/office/powerpoint/2010/main" val="298003715"/>
       </p:ext>
     </p:extLst>
   </p:cSld>
@@ -1415,7 +1416,7 @@
     </p:spTree>
     <p:extLst>
       <p:ext uri="{BB962C8B-B14F-4D97-AF65-F5344CB8AC3E}">
-        <p14:creationId xmlns:p14="http://schemas.microsoft.com/office/powerpoint/2010/main" val="4172283197"/>
+        <p14:creationId xmlns:p14="http://schemas.microsoft.com/office/powerpoint/2010/main" val="3334544210"/>
       </p:ext>
     </p:extLst>
   </p:cSld>
@@ -1583,7 +1584,7 @@
     </p:spTree>
     <p:extLst>
       <p:ext uri="{BB962C8B-B14F-4D97-AF65-F5344CB8AC3E}">
-        <p14:creationId xmlns:p14="http://schemas.microsoft.com/office/powerpoint/2010/main" val="693634556"/>
+        <p14:creationId xmlns:p14="http://schemas.microsoft.com/office/powerpoint/2010/main" val="4172283197"/>
       </p:ext>
     </p:extLst>
   </p:cSld>
@@ -1667,7 +1668,7 @@
     </p:spTree>
     <p:extLst>
       <p:ext uri="{BB962C8B-B14F-4D97-AF65-F5344CB8AC3E}">
-        <p14:creationId xmlns:p14="http://schemas.microsoft.com/office/powerpoint/2010/main" val="4118111675"/>
+        <p14:creationId xmlns:p14="http://schemas.microsoft.com/office/powerpoint/2010/main" val="693634556"/>
       </p:ext>
     </p:extLst>
   </p:cSld>
@@ -1751,7 +1752,7 @@
     </p:spTree>
     <p:extLst>
       <p:ext uri="{BB962C8B-B14F-4D97-AF65-F5344CB8AC3E}">
-        <p14:creationId xmlns:p14="http://schemas.microsoft.com/office/powerpoint/2010/main" val="4214657245"/>
+        <p14:creationId xmlns:p14="http://schemas.microsoft.com/office/powerpoint/2010/main" val="4118111675"/>
       </p:ext>
     </p:extLst>
   </p:cSld>
@@ -1835,7 +1836,7 @@
     </p:spTree>
     <p:extLst>
       <p:ext uri="{BB962C8B-B14F-4D97-AF65-F5344CB8AC3E}">
-        <p14:creationId xmlns:p14="http://schemas.microsoft.com/office/powerpoint/2010/main" val="1270211047"/>
+        <p14:creationId xmlns:p14="http://schemas.microsoft.com/office/powerpoint/2010/main" val="4214657245"/>
       </p:ext>
     </p:extLst>
   </p:cSld>
@@ -1919,7 +1920,7 @@
     </p:spTree>
     <p:extLst>
       <p:ext uri="{BB962C8B-B14F-4D97-AF65-F5344CB8AC3E}">
-        <p14:creationId xmlns:p14="http://schemas.microsoft.com/office/powerpoint/2010/main" val="2163066296"/>
+        <p14:creationId xmlns:p14="http://schemas.microsoft.com/office/powerpoint/2010/main" val="1270211047"/>
       </p:ext>
     </p:extLst>
   </p:cSld>
@@ -2003,7 +2004,7 @@
     </p:spTree>
     <p:extLst>
       <p:ext uri="{BB962C8B-B14F-4D97-AF65-F5344CB8AC3E}">
-        <p14:creationId xmlns:p14="http://schemas.microsoft.com/office/powerpoint/2010/main" val="4048309794"/>
+        <p14:creationId xmlns:p14="http://schemas.microsoft.com/office/powerpoint/2010/main" val="2163066296"/>
       </p:ext>
     </p:extLst>
   </p:cSld>
@@ -2087,7 +2088,7 @@
     </p:spTree>
     <p:extLst>
       <p:ext uri="{BB962C8B-B14F-4D97-AF65-F5344CB8AC3E}">
-        <p14:creationId xmlns:p14="http://schemas.microsoft.com/office/powerpoint/2010/main" val="2349885239"/>
+        <p14:creationId xmlns:p14="http://schemas.microsoft.com/office/powerpoint/2010/main" val="4048309794"/>
       </p:ext>
     </p:extLst>
   </p:cSld>
@@ -2171,7 +2172,7 @@
     </p:spTree>
     <p:extLst>
       <p:ext uri="{BB962C8B-B14F-4D97-AF65-F5344CB8AC3E}">
-        <p14:creationId xmlns:p14="http://schemas.microsoft.com/office/powerpoint/2010/main" val="3103926432"/>
+        <p14:creationId xmlns:p14="http://schemas.microsoft.com/office/powerpoint/2010/main" val="2349885239"/>
       </p:ext>
     </p:extLst>
   </p:cSld>
@@ -2255,7 +2256,7 @@
     </p:spTree>
     <p:extLst>
       <p:ext uri="{BB962C8B-B14F-4D97-AF65-F5344CB8AC3E}">
-        <p14:creationId xmlns:p14="http://schemas.microsoft.com/office/powerpoint/2010/main" val="3190296764"/>
+        <p14:creationId xmlns:p14="http://schemas.microsoft.com/office/powerpoint/2010/main" val="3103926432"/>
       </p:ext>
     </p:extLst>
   </p:cSld>
@@ -2339,7 +2340,7 @@
     </p:spTree>
     <p:extLst>
       <p:ext uri="{BB962C8B-B14F-4D97-AF65-F5344CB8AC3E}">
-        <p14:creationId xmlns:p14="http://schemas.microsoft.com/office/powerpoint/2010/main" val="1948940635"/>
+        <p14:creationId xmlns:p14="http://schemas.microsoft.com/office/powerpoint/2010/main" val="3190296764"/>
       </p:ext>
     </p:extLst>
   </p:cSld>
@@ -2424,6 +2425,90 @@
     <p:extLst>
       <p:ext uri="{BB962C8B-B14F-4D97-AF65-F5344CB8AC3E}">
         <p14:creationId xmlns:p14="http://schemas.microsoft.com/office/powerpoint/2010/main" val="241741971"/>
+      </p:ext>
+    </p:extLst>
+  </p:cSld>
+  <p:clrMapOvr>
+    <a:masterClrMapping/>
+  </p:clrMapOvr>
+</p:notes>
+</file>
+
+<file path=ppt/notesSlides/notesSlide30.xml><?xml version="1.0" encoding="utf-8"?>
+<p:notes xmlns:a="http://schemas.openxmlformats.org/drawingml/2006/main" xmlns:r="http://schemas.openxmlformats.org/officeDocument/2006/relationships" xmlns:p="http://schemas.openxmlformats.org/presentationml/2006/main">
+  <p:cSld>
+    <p:spTree>
+      <p:nvGrpSpPr>
+        <p:cNvPr id="1" name=""/>
+        <p:cNvGrpSpPr/>
+        <p:nvPr/>
+      </p:nvGrpSpPr>
+      <p:grpSpPr>
+        <a:xfrm>
+          <a:off x="0" y="0"/>
+          <a:ext cx="0" cy="0"/>
+          <a:chOff x="0" y="0"/>
+          <a:chExt cx="0" cy="0"/>
+        </a:xfrm>
+      </p:grpSpPr>
+      <p:sp>
+        <p:nvSpPr>
+          <p:cNvPr id="2" name="Slide Image Placeholder 1"/>
+          <p:cNvSpPr>
+            <a:spLocks noGrp="1" noRot="1" noChangeAspect="1"/>
+          </p:cNvSpPr>
+          <p:nvPr>
+            <p:ph type="sldImg"/>
+          </p:nvPr>
+        </p:nvSpPr>
+        <p:spPr/>
+      </p:sp>
+      <p:sp>
+        <p:nvSpPr>
+          <p:cNvPr id="3" name="Notes Placeholder 2"/>
+          <p:cNvSpPr>
+            <a:spLocks noGrp="1"/>
+          </p:cNvSpPr>
+          <p:nvPr>
+            <p:ph type="body" idx="1"/>
+          </p:nvPr>
+        </p:nvSpPr>
+        <p:spPr/>
+        <p:txBody>
+          <a:bodyPr/>
+          <a:lstStyle/>
+          <a:p>
+            <a:endParaRPr lang="en-PH" dirty="0"/>
+          </a:p>
+        </p:txBody>
+      </p:sp>
+      <p:sp>
+        <p:nvSpPr>
+          <p:cNvPr id="4" name="Slide Number Placeholder 3"/>
+          <p:cNvSpPr>
+            <a:spLocks noGrp="1"/>
+          </p:cNvSpPr>
+          <p:nvPr>
+            <p:ph type="sldNum" sz="quarter" idx="5"/>
+          </p:nvPr>
+        </p:nvSpPr>
+        <p:spPr/>
+        <p:txBody>
+          <a:bodyPr/>
+          <a:lstStyle/>
+          <a:p>
+            <a:fld id="{FE90CCE9-4AAE-4E1F-85AD-521A406D6524}" type="slidenum">
+              <a:rPr lang="en-PH" smtClean="0"/>
+              <a:t>30</a:t>
+            </a:fld>
+            <a:endParaRPr lang="en-PH"/>
+          </a:p>
+        </p:txBody>
+      </p:sp>
+    </p:spTree>
+    <p:extLst>
+      <p:ext uri="{BB962C8B-B14F-4D97-AF65-F5344CB8AC3E}">
+        <p14:creationId xmlns:p14="http://schemas.microsoft.com/office/powerpoint/2010/main" val="1948940635"/>
       </p:ext>
     </p:extLst>
   </p:cSld>
@@ -2675,7 +2760,7 @@
     </p:spTree>
     <p:extLst>
       <p:ext uri="{BB962C8B-B14F-4D97-AF65-F5344CB8AC3E}">
-        <p14:creationId xmlns:p14="http://schemas.microsoft.com/office/powerpoint/2010/main" val="3040372543"/>
+        <p14:creationId xmlns:p14="http://schemas.microsoft.com/office/powerpoint/2010/main" val="1944700889"/>
       </p:ext>
     </p:extLst>
   </p:cSld>
@@ -2759,7 +2844,7 @@
     </p:spTree>
     <p:extLst>
       <p:ext uri="{BB962C8B-B14F-4D97-AF65-F5344CB8AC3E}">
-        <p14:creationId xmlns:p14="http://schemas.microsoft.com/office/powerpoint/2010/main" val="1690442089"/>
+        <p14:creationId xmlns:p14="http://schemas.microsoft.com/office/powerpoint/2010/main" val="3040372543"/>
       </p:ext>
     </p:extLst>
   </p:cSld>
@@ -2843,7 +2928,7 @@
     </p:spTree>
     <p:extLst>
       <p:ext uri="{BB962C8B-B14F-4D97-AF65-F5344CB8AC3E}">
-        <p14:creationId xmlns:p14="http://schemas.microsoft.com/office/powerpoint/2010/main" val="172701261"/>
+        <p14:creationId xmlns:p14="http://schemas.microsoft.com/office/powerpoint/2010/main" val="1690442089"/>
       </p:ext>
     </p:extLst>
   </p:cSld>
@@ -2927,7 +3012,7 @@
     </p:spTree>
     <p:extLst>
       <p:ext uri="{BB962C8B-B14F-4D97-AF65-F5344CB8AC3E}">
-        <p14:creationId xmlns:p14="http://schemas.microsoft.com/office/powerpoint/2010/main" val="1944665232"/>
+        <p14:creationId xmlns:p14="http://schemas.microsoft.com/office/powerpoint/2010/main" val="172701261"/>
       </p:ext>
     </p:extLst>
   </p:cSld>
@@ -6490,7 +6575,7 @@
           <a:p>
             <a:r>
               <a:rPr lang="en-GB" sz="5000" b="1" dirty="0"/>
-              <a:t>Count Vectorizer</a:t>
+              <a:t>Lemmatization</a:t>
             </a:r>
             <a:endParaRPr lang="en-PH" sz="5000" b="1" dirty="0"/>
           </a:p>
@@ -6498,10 +6583,10 @@
       </p:sp>
       <p:sp>
         <p:nvSpPr>
-          <p:cNvPr id="6" name="TextBox 5">
+          <p:cNvPr id="3" name="TextBox 2">
             <a:extLst>
               <a:ext uri="{FF2B5EF4-FFF2-40B4-BE49-F238E27FC236}">
-                <a16:creationId xmlns:a16="http://schemas.microsoft.com/office/drawing/2014/main" id="{5E5DC7C9-6A45-A3E2-F421-2A25E3B5F5E1}"/>
+                <a16:creationId xmlns:a16="http://schemas.microsoft.com/office/drawing/2014/main" id="{2F457E6A-8A4F-6FA8-BC00-1B4BACAA4188}"/>
               </a:ext>
             </a:extLst>
           </p:cNvPr>
@@ -6510,8 +6595,8 @@
         </p:nvSpPr>
         <p:spPr>
           <a:xfrm>
-            <a:off x="459203" y="1368125"/>
-            <a:ext cx="11273589" cy="2400657"/>
+            <a:off x="872871" y="2572259"/>
+            <a:ext cx="3720395" cy="1126270"/>
           </a:xfrm>
           <a:prstGeom prst="rect">
             <a:avLst/>
@@ -6524,51 +6609,616 @@
           </a:bodyPr>
           <a:lstStyle/>
           <a:p>
+            <a:pPr>
+              <a:lnSpc>
+                <a:spcPct val="150000"/>
+              </a:lnSpc>
+            </a:pPr>
+            <a:r>
+              <a:rPr lang="en-PH" sz="5000" dirty="0">
+                <a:latin typeface="Consolas" panose="020B0609020204030204" pitchFamily="49" charset="0"/>
+                <a:cs typeface="Consolas" panose="020B0609020204030204" pitchFamily="49" charset="0"/>
+              </a:rPr>
+              <a:t>Changing</a:t>
+            </a:r>
+          </a:p>
+        </p:txBody>
+      </p:sp>
+      <p:sp>
+        <p:nvSpPr>
+          <p:cNvPr id="6" name="TextBox 5">
+            <a:extLst>
+              <a:ext uri="{FF2B5EF4-FFF2-40B4-BE49-F238E27FC236}">
+                <a16:creationId xmlns:a16="http://schemas.microsoft.com/office/drawing/2014/main" id="{5E5DC7C9-6A45-A3E2-F421-2A25E3B5F5E1}"/>
+              </a:ext>
+            </a:extLst>
+          </p:cNvPr>
+          <p:cNvSpPr txBox="1"/>
+          <p:nvPr/>
+        </p:nvSpPr>
+        <p:spPr>
+          <a:xfrm>
+            <a:off x="459203" y="1368125"/>
+            <a:ext cx="11273589" cy="1246495"/>
+          </a:xfrm>
+          <a:prstGeom prst="rect">
+            <a:avLst/>
+          </a:prstGeom>
+          <a:noFill/>
+        </p:spPr>
+        <p:txBody>
+          <a:bodyPr wrap="square">
+            <a:spAutoFit/>
+          </a:bodyPr>
+          <a:lstStyle/>
+          <a:p>
             <a:pPr algn="l"/>
             <a:r>
-              <a:rPr lang="en-PH" sz="3000" dirty="0" err="1"/>
-              <a:t>CountVectorizer</a:t>
-            </a:r>
-            <a:r>
-              <a:rPr lang="en-PH" sz="3000" dirty="0"/>
-              <a:t> is used to </a:t>
-            </a:r>
-            <a:r>
-              <a:rPr lang="en-PH" sz="3000" b="1" dirty="0">
+              <a:rPr lang="en-PH" sz="2500" dirty="0"/>
+              <a:t>Lemmatization goes beyond simple word reduction and </a:t>
+            </a:r>
+            <a:r>
+              <a:rPr lang="en-PH" sz="2500" b="1" dirty="0">
                 <a:solidFill>
                   <a:srgbClr val="00B0F0"/>
                 </a:solidFill>
               </a:rPr>
-              <a:t>convert text data into numerical form</a:t>
-            </a:r>
-            <a:r>
-              <a:rPr lang="en-PH" sz="3000" dirty="0"/>
-              <a:t>. </a:t>
-            </a:r>
-          </a:p>
-          <a:p>
-            <a:pPr algn="l"/>
-            <a:endParaRPr lang="en-PH" sz="3000" dirty="0"/>
-          </a:p>
-          <a:p>
-            <a:pPr algn="l"/>
-            <a:r>
-              <a:rPr lang="en-PH" sz="3000" dirty="0"/>
-              <a:t>This creates a bag of words where each word is treated as a separate feature and the count of each word in a given document is used as the value of that feature.</a:t>
+              <a:t>considers the context of a word in a sentence.</a:t>
+            </a:r>
+            <a:r>
+              <a:rPr lang="en-PH" sz="2500" dirty="0"/>
+              <a:t> It analyzes the part of speech and meaning to accurately convert words to their base form. A lemma is the base form or dictionary form of a word.</a:t>
             </a:r>
           </a:p>
         </p:txBody>
       </p:sp>
+      <p:sp>
+        <p:nvSpPr>
+          <p:cNvPr id="2" name="TextBox 1">
+            <a:extLst>
+              <a:ext uri="{FF2B5EF4-FFF2-40B4-BE49-F238E27FC236}">
+                <a16:creationId xmlns:a16="http://schemas.microsoft.com/office/drawing/2014/main" id="{346E2712-BFDB-1C43-290F-35C1EC8FFCA5}"/>
+              </a:ext>
+            </a:extLst>
+          </p:cNvPr>
+          <p:cNvSpPr txBox="1"/>
+          <p:nvPr/>
+        </p:nvSpPr>
+        <p:spPr>
+          <a:xfrm>
+            <a:off x="872871" y="3844239"/>
+            <a:ext cx="3709761" cy="1126270"/>
+          </a:xfrm>
+          <a:prstGeom prst="rect">
+            <a:avLst/>
+          </a:prstGeom>
+          <a:noFill/>
+        </p:spPr>
+        <p:txBody>
+          <a:bodyPr wrap="square">
+            <a:spAutoFit/>
+          </a:bodyPr>
+          <a:lstStyle/>
+          <a:p>
+            <a:pPr>
+              <a:lnSpc>
+                <a:spcPct val="150000"/>
+              </a:lnSpc>
+            </a:pPr>
+            <a:r>
+              <a:rPr lang="en-PH" sz="5000" dirty="0">
+                <a:latin typeface="Consolas" panose="020B0609020204030204" pitchFamily="49" charset="0"/>
+                <a:cs typeface="Consolas" panose="020B0609020204030204" pitchFamily="49" charset="0"/>
+              </a:rPr>
+              <a:t>Changed</a:t>
+            </a:r>
+          </a:p>
+        </p:txBody>
+      </p:sp>
+      <p:sp>
+        <p:nvSpPr>
+          <p:cNvPr id="5" name="TextBox 4">
+            <a:extLst>
+              <a:ext uri="{FF2B5EF4-FFF2-40B4-BE49-F238E27FC236}">
+                <a16:creationId xmlns:a16="http://schemas.microsoft.com/office/drawing/2014/main" id="{926702AB-1B38-0498-E9A7-39EC1F9CFD22}"/>
+              </a:ext>
+            </a:extLst>
+          </p:cNvPr>
+          <p:cNvSpPr txBox="1"/>
+          <p:nvPr/>
+        </p:nvSpPr>
+        <p:spPr>
+          <a:xfrm>
+            <a:off x="883505" y="4927748"/>
+            <a:ext cx="3720395" cy="1126270"/>
+          </a:xfrm>
+          <a:prstGeom prst="rect">
+            <a:avLst/>
+          </a:prstGeom>
+          <a:noFill/>
+        </p:spPr>
+        <p:txBody>
+          <a:bodyPr wrap="square">
+            <a:spAutoFit/>
+          </a:bodyPr>
+          <a:lstStyle/>
+          <a:p>
+            <a:pPr>
+              <a:lnSpc>
+                <a:spcPct val="150000"/>
+              </a:lnSpc>
+            </a:pPr>
+            <a:r>
+              <a:rPr lang="en-PH" sz="5000" dirty="0">
+                <a:latin typeface="Consolas" panose="020B0609020204030204" pitchFamily="49" charset="0"/>
+                <a:cs typeface="Consolas" panose="020B0609020204030204" pitchFamily="49" charset="0"/>
+              </a:rPr>
+              <a:t>Change</a:t>
+            </a:r>
+          </a:p>
+        </p:txBody>
+      </p:sp>
+      <p:grpSp>
+        <p:nvGrpSpPr>
+          <p:cNvPr id="28" name="Group 27">
+            <a:extLst>
+              <a:ext uri="{FF2B5EF4-FFF2-40B4-BE49-F238E27FC236}">
+                <a16:creationId xmlns:a16="http://schemas.microsoft.com/office/drawing/2014/main" id="{4907F9CD-A9AD-CD0B-F24D-3643398C7842}"/>
+              </a:ext>
+            </a:extLst>
+          </p:cNvPr>
+          <p:cNvGrpSpPr/>
+          <p:nvPr/>
+        </p:nvGrpSpPr>
+        <p:grpSpPr>
+          <a:xfrm>
+            <a:off x="4582632" y="3135394"/>
+            <a:ext cx="5752215" cy="2355489"/>
+            <a:chOff x="4582632" y="3135394"/>
+            <a:chExt cx="5752215" cy="2355489"/>
+          </a:xfrm>
+        </p:grpSpPr>
+        <p:sp>
+          <p:nvSpPr>
+            <p:cNvPr id="7" name="TextBox 6">
+              <a:extLst>
+                <a:ext uri="{FF2B5EF4-FFF2-40B4-BE49-F238E27FC236}">
+                  <a16:creationId xmlns:a16="http://schemas.microsoft.com/office/drawing/2014/main" id="{8C20B39E-9926-6A0A-A903-B11D76E8CCF5}"/>
+                </a:ext>
+              </a:extLst>
+            </p:cNvPr>
+            <p:cNvSpPr txBox="1"/>
+            <p:nvPr/>
+          </p:nvSpPr>
+          <p:spPr>
+            <a:xfrm>
+              <a:off x="7309113" y="3844239"/>
+              <a:ext cx="3025734" cy="1126270"/>
+            </a:xfrm>
+            <a:prstGeom prst="rect">
+              <a:avLst/>
+            </a:prstGeom>
+            <a:noFill/>
+          </p:spPr>
+          <p:txBody>
+            <a:bodyPr wrap="square">
+              <a:spAutoFit/>
+            </a:bodyPr>
+            <a:lstStyle/>
+            <a:p>
+              <a:pPr>
+                <a:lnSpc>
+                  <a:spcPct val="150000"/>
+                </a:lnSpc>
+              </a:pPr>
+              <a:r>
+                <a:rPr lang="en-PH" sz="5000" b="1" dirty="0">
+                  <a:solidFill>
+                    <a:srgbClr val="00B050"/>
+                  </a:solidFill>
+                  <a:latin typeface="Consolas" panose="020B0609020204030204" pitchFamily="49" charset="0"/>
+                  <a:cs typeface="Consolas" panose="020B0609020204030204" pitchFamily="49" charset="0"/>
+                </a:rPr>
+                <a:t>Change</a:t>
+              </a:r>
+            </a:p>
+          </p:txBody>
+        </p:sp>
+        <p:cxnSp>
+          <p:nvCxnSpPr>
+            <p:cNvPr id="9" name="Straight Arrow Connector 8">
+              <a:extLst>
+                <a:ext uri="{FF2B5EF4-FFF2-40B4-BE49-F238E27FC236}">
+                  <a16:creationId xmlns:a16="http://schemas.microsoft.com/office/drawing/2014/main" id="{B6DA4648-B70E-2827-7322-70D3DF5D98DC}"/>
+                </a:ext>
+              </a:extLst>
+            </p:cNvPr>
+            <p:cNvCxnSpPr>
+              <a:stCxn id="3" idx="3"/>
+              <a:endCxn id="7" idx="1"/>
+            </p:cNvCxnSpPr>
+            <p:nvPr/>
+          </p:nvCxnSpPr>
+          <p:spPr>
+            <a:xfrm>
+              <a:off x="4593266" y="3135394"/>
+              <a:ext cx="2715847" cy="1271980"/>
+            </a:xfrm>
+            <a:prstGeom prst="straightConnector1">
+              <a:avLst/>
+            </a:prstGeom>
+            <a:ln w="76200">
+              <a:solidFill>
+                <a:schemeClr val="tx1"/>
+              </a:solidFill>
+              <a:tailEnd type="triangle"/>
+            </a:ln>
+          </p:spPr>
+          <p:style>
+            <a:lnRef idx="1">
+              <a:schemeClr val="accent1"/>
+            </a:lnRef>
+            <a:fillRef idx="0">
+              <a:schemeClr val="accent1"/>
+            </a:fillRef>
+            <a:effectRef idx="0">
+              <a:schemeClr val="accent1"/>
+            </a:effectRef>
+            <a:fontRef idx="minor">
+              <a:schemeClr val="tx1"/>
+            </a:fontRef>
+          </p:style>
+        </p:cxnSp>
+        <p:cxnSp>
+          <p:nvCxnSpPr>
+            <p:cNvPr id="10" name="Straight Arrow Connector 9">
+              <a:extLst>
+                <a:ext uri="{FF2B5EF4-FFF2-40B4-BE49-F238E27FC236}">
+                  <a16:creationId xmlns:a16="http://schemas.microsoft.com/office/drawing/2014/main" id="{AF5CD6C1-6D06-A8DC-C0DB-45A031593D4C}"/>
+                </a:ext>
+              </a:extLst>
+            </p:cNvPr>
+            <p:cNvCxnSpPr>
+              <a:cxnSpLocks/>
+              <a:stCxn id="5" idx="3"/>
+              <a:endCxn id="7" idx="1"/>
+            </p:cNvCxnSpPr>
+            <p:nvPr/>
+          </p:nvCxnSpPr>
+          <p:spPr>
+            <a:xfrm flipV="1">
+              <a:off x="4603900" y="4407374"/>
+              <a:ext cx="2705213" cy="1083509"/>
+            </a:xfrm>
+            <a:prstGeom prst="straightConnector1">
+              <a:avLst/>
+            </a:prstGeom>
+            <a:ln w="76200">
+              <a:solidFill>
+                <a:schemeClr val="tx1"/>
+              </a:solidFill>
+              <a:tailEnd type="triangle"/>
+            </a:ln>
+          </p:spPr>
+          <p:style>
+            <a:lnRef idx="1">
+              <a:schemeClr val="accent1"/>
+            </a:lnRef>
+            <a:fillRef idx="0">
+              <a:schemeClr val="accent1"/>
+            </a:fillRef>
+            <a:effectRef idx="0">
+              <a:schemeClr val="accent1"/>
+            </a:effectRef>
+            <a:fontRef idx="minor">
+              <a:schemeClr val="tx1"/>
+            </a:fontRef>
+          </p:style>
+        </p:cxnSp>
+        <p:cxnSp>
+          <p:nvCxnSpPr>
+            <p:cNvPr id="13" name="Straight Arrow Connector 12">
+              <a:extLst>
+                <a:ext uri="{FF2B5EF4-FFF2-40B4-BE49-F238E27FC236}">
+                  <a16:creationId xmlns:a16="http://schemas.microsoft.com/office/drawing/2014/main" id="{4A34A73D-E020-D727-ED58-E4820F424FC9}"/>
+                </a:ext>
+              </a:extLst>
+            </p:cNvPr>
+            <p:cNvCxnSpPr>
+              <a:cxnSpLocks/>
+              <a:stCxn id="2" idx="3"/>
+              <a:endCxn id="7" idx="1"/>
+            </p:cNvCxnSpPr>
+            <p:nvPr/>
+          </p:nvCxnSpPr>
+          <p:spPr>
+            <a:xfrm>
+              <a:off x="4582632" y="4407374"/>
+              <a:ext cx="2726481" cy="0"/>
+            </a:xfrm>
+            <a:prstGeom prst="straightConnector1">
+              <a:avLst/>
+            </a:prstGeom>
+            <a:ln w="76200">
+              <a:solidFill>
+                <a:schemeClr val="tx1"/>
+              </a:solidFill>
+              <a:tailEnd type="triangle"/>
+            </a:ln>
+          </p:spPr>
+          <p:style>
+            <a:lnRef idx="1">
+              <a:schemeClr val="accent1"/>
+            </a:lnRef>
+            <a:fillRef idx="0">
+              <a:schemeClr val="accent1"/>
+            </a:fillRef>
+            <a:effectRef idx="0">
+              <a:schemeClr val="accent1"/>
+            </a:effectRef>
+            <a:fontRef idx="minor">
+              <a:schemeClr val="tx1"/>
+            </a:fontRef>
+          </p:style>
+        </p:cxnSp>
+      </p:grpSp>
     </p:spTree>
     <p:extLst>
       <p:ext uri="{BB962C8B-B14F-4D97-AF65-F5344CB8AC3E}">
-        <p14:creationId xmlns:p14="http://schemas.microsoft.com/office/powerpoint/2010/main" val="1803023922"/>
+        <p14:creationId xmlns:p14="http://schemas.microsoft.com/office/powerpoint/2010/main" val="1855864219"/>
       </p:ext>
     </p:extLst>
   </p:cSld>
   <p:clrMapOvr>
     <a:masterClrMapping/>
   </p:clrMapOvr>
+  <p:timing>
+    <p:tnLst>
+      <p:par>
+        <p:cTn id="1" dur="indefinite" restart="never" nodeType="tmRoot">
+          <p:childTnLst>
+            <p:seq concurrent="1" nextAc="seek">
+              <p:cTn id="2" dur="indefinite" nodeType="mainSeq">
+                <p:childTnLst>
+                  <p:par>
+                    <p:cTn id="3" fill="hold">
+                      <p:stCondLst>
+                        <p:cond delay="indefinite"/>
+                      </p:stCondLst>
+                      <p:childTnLst>
+                        <p:par>
+                          <p:cTn id="4" fill="hold">
+                            <p:stCondLst>
+                              <p:cond delay="0"/>
+                            </p:stCondLst>
+                            <p:childTnLst>
+                              <p:par>
+                                <p:cTn id="5" presetID="9" presetClass="entr" presetSubtype="0" fill="hold" grpId="0" nodeType="clickEffect">
+                                  <p:stCondLst>
+                                    <p:cond delay="0"/>
+                                  </p:stCondLst>
+                                  <p:childTnLst>
+                                    <p:set>
+                                      <p:cBhvr>
+                                        <p:cTn id="6" dur="1" fill="hold">
+                                          <p:stCondLst>
+                                            <p:cond delay="0"/>
+                                          </p:stCondLst>
+                                        </p:cTn>
+                                        <p:tgtEl>
+                                          <p:spTgt spid="3"/>
+                                        </p:tgtEl>
+                                        <p:attrNameLst>
+                                          <p:attrName>style.visibility</p:attrName>
+                                        </p:attrNameLst>
+                                      </p:cBhvr>
+                                      <p:to>
+                                        <p:strVal val="visible"/>
+                                      </p:to>
+                                    </p:set>
+                                    <p:animEffect transition="in" filter="dissolve">
+                                      <p:cBhvr>
+                                        <p:cTn id="7" dur="500"/>
+                                        <p:tgtEl>
+                                          <p:spTgt spid="3"/>
+                                        </p:tgtEl>
+                                      </p:cBhvr>
+                                    </p:animEffect>
+                                  </p:childTnLst>
+                                </p:cTn>
+                              </p:par>
+                            </p:childTnLst>
+                          </p:cTn>
+                        </p:par>
+                      </p:childTnLst>
+                    </p:cTn>
+                  </p:par>
+                  <p:par>
+                    <p:cTn id="8" fill="hold">
+                      <p:stCondLst>
+                        <p:cond delay="indefinite"/>
+                      </p:stCondLst>
+                      <p:childTnLst>
+                        <p:par>
+                          <p:cTn id="9" fill="hold">
+                            <p:stCondLst>
+                              <p:cond delay="0"/>
+                            </p:stCondLst>
+                            <p:childTnLst>
+                              <p:par>
+                                <p:cTn id="10" presetID="9" presetClass="entr" presetSubtype="0" fill="hold" grpId="0" nodeType="clickEffect">
+                                  <p:stCondLst>
+                                    <p:cond delay="0"/>
+                                  </p:stCondLst>
+                                  <p:childTnLst>
+                                    <p:set>
+                                      <p:cBhvr>
+                                        <p:cTn id="11" dur="1" fill="hold">
+                                          <p:stCondLst>
+                                            <p:cond delay="0"/>
+                                          </p:stCondLst>
+                                        </p:cTn>
+                                        <p:tgtEl>
+                                          <p:spTgt spid="2"/>
+                                        </p:tgtEl>
+                                        <p:attrNameLst>
+                                          <p:attrName>style.visibility</p:attrName>
+                                        </p:attrNameLst>
+                                      </p:cBhvr>
+                                      <p:to>
+                                        <p:strVal val="visible"/>
+                                      </p:to>
+                                    </p:set>
+                                    <p:animEffect transition="in" filter="dissolve">
+                                      <p:cBhvr>
+                                        <p:cTn id="12" dur="500"/>
+                                        <p:tgtEl>
+                                          <p:spTgt spid="2"/>
+                                        </p:tgtEl>
+                                      </p:cBhvr>
+                                    </p:animEffect>
+                                  </p:childTnLst>
+                                </p:cTn>
+                              </p:par>
+                            </p:childTnLst>
+                          </p:cTn>
+                        </p:par>
+                      </p:childTnLst>
+                    </p:cTn>
+                  </p:par>
+                  <p:par>
+                    <p:cTn id="13" fill="hold">
+                      <p:stCondLst>
+                        <p:cond delay="indefinite"/>
+                      </p:stCondLst>
+                      <p:childTnLst>
+                        <p:par>
+                          <p:cTn id="14" fill="hold">
+                            <p:stCondLst>
+                              <p:cond delay="0"/>
+                            </p:stCondLst>
+                            <p:childTnLst>
+                              <p:par>
+                                <p:cTn id="15" presetID="9" presetClass="entr" presetSubtype="0" fill="hold" grpId="0" nodeType="clickEffect">
+                                  <p:stCondLst>
+                                    <p:cond delay="0"/>
+                                  </p:stCondLst>
+                                  <p:childTnLst>
+                                    <p:set>
+                                      <p:cBhvr>
+                                        <p:cTn id="16" dur="1" fill="hold">
+                                          <p:stCondLst>
+                                            <p:cond delay="0"/>
+                                          </p:stCondLst>
+                                        </p:cTn>
+                                        <p:tgtEl>
+                                          <p:spTgt spid="5"/>
+                                        </p:tgtEl>
+                                        <p:attrNameLst>
+                                          <p:attrName>style.visibility</p:attrName>
+                                        </p:attrNameLst>
+                                      </p:cBhvr>
+                                      <p:to>
+                                        <p:strVal val="visible"/>
+                                      </p:to>
+                                    </p:set>
+                                    <p:animEffect transition="in" filter="dissolve">
+                                      <p:cBhvr>
+                                        <p:cTn id="17" dur="500"/>
+                                        <p:tgtEl>
+                                          <p:spTgt spid="5"/>
+                                        </p:tgtEl>
+                                      </p:cBhvr>
+                                    </p:animEffect>
+                                  </p:childTnLst>
+                                </p:cTn>
+                              </p:par>
+                            </p:childTnLst>
+                          </p:cTn>
+                        </p:par>
+                      </p:childTnLst>
+                    </p:cTn>
+                  </p:par>
+                  <p:par>
+                    <p:cTn id="18" fill="hold">
+                      <p:stCondLst>
+                        <p:cond delay="indefinite"/>
+                      </p:stCondLst>
+                      <p:childTnLst>
+                        <p:par>
+                          <p:cTn id="19" fill="hold">
+                            <p:stCondLst>
+                              <p:cond delay="0"/>
+                            </p:stCondLst>
+                            <p:childTnLst>
+                              <p:par>
+                                <p:cTn id="20" presetID="9" presetClass="entr" presetSubtype="0" fill="hold" nodeType="clickEffect">
+                                  <p:stCondLst>
+                                    <p:cond delay="0"/>
+                                  </p:stCondLst>
+                                  <p:childTnLst>
+                                    <p:set>
+                                      <p:cBhvr>
+                                        <p:cTn id="21" dur="1" fill="hold">
+                                          <p:stCondLst>
+                                            <p:cond delay="0"/>
+                                          </p:stCondLst>
+                                        </p:cTn>
+                                        <p:tgtEl>
+                                          <p:spTgt spid="28"/>
+                                        </p:tgtEl>
+                                        <p:attrNameLst>
+                                          <p:attrName>style.visibility</p:attrName>
+                                        </p:attrNameLst>
+                                      </p:cBhvr>
+                                      <p:to>
+                                        <p:strVal val="visible"/>
+                                      </p:to>
+                                    </p:set>
+                                    <p:animEffect transition="in" filter="dissolve">
+                                      <p:cBhvr>
+                                        <p:cTn id="22" dur="500"/>
+                                        <p:tgtEl>
+                                          <p:spTgt spid="28"/>
+                                        </p:tgtEl>
+                                      </p:cBhvr>
+                                    </p:animEffect>
+                                  </p:childTnLst>
+                                </p:cTn>
+                              </p:par>
+                            </p:childTnLst>
+                          </p:cTn>
+                        </p:par>
+                      </p:childTnLst>
+                    </p:cTn>
+                  </p:par>
+                </p:childTnLst>
+              </p:cTn>
+              <p:prevCondLst>
+                <p:cond evt="onPrev" delay="0">
+                  <p:tgtEl>
+                    <p:sldTgt/>
+                  </p:tgtEl>
+                </p:cond>
+              </p:prevCondLst>
+              <p:nextCondLst>
+                <p:cond evt="onNext" delay="0">
+                  <p:tgtEl>
+                    <p:sldTgt/>
+                  </p:tgtEl>
+                </p:cond>
+              </p:nextCondLst>
+            </p:seq>
+          </p:childTnLst>
+        </p:cTn>
+      </p:par>
+    </p:tnLst>
+    <p:bldLst>
+      <p:bldP spid="3" grpId="0"/>
+      <p:bldP spid="2" grpId="0"/>
+      <p:bldP spid="5" grpId="0"/>
+    </p:bldLst>
+  </p:timing>
 </p:sld>
 </file>
 
@@ -6688,6 +7338,196 @@
       </p:sp>
       <p:sp>
         <p:nvSpPr>
+          <p:cNvPr id="6" name="TextBox 5">
+            <a:extLst>
+              <a:ext uri="{FF2B5EF4-FFF2-40B4-BE49-F238E27FC236}">
+                <a16:creationId xmlns:a16="http://schemas.microsoft.com/office/drawing/2014/main" id="{5E5DC7C9-6A45-A3E2-F421-2A25E3B5F5E1}"/>
+              </a:ext>
+            </a:extLst>
+          </p:cNvPr>
+          <p:cNvSpPr txBox="1"/>
+          <p:nvPr/>
+        </p:nvSpPr>
+        <p:spPr>
+          <a:xfrm>
+            <a:off x="459203" y="1368125"/>
+            <a:ext cx="11273589" cy="2400657"/>
+          </a:xfrm>
+          <a:prstGeom prst="rect">
+            <a:avLst/>
+          </a:prstGeom>
+          <a:noFill/>
+        </p:spPr>
+        <p:txBody>
+          <a:bodyPr wrap="square">
+            <a:spAutoFit/>
+          </a:bodyPr>
+          <a:lstStyle/>
+          <a:p>
+            <a:pPr algn="l"/>
+            <a:r>
+              <a:rPr lang="en-PH" sz="3000" dirty="0" err="1"/>
+              <a:t>CountVectorizer</a:t>
+            </a:r>
+            <a:r>
+              <a:rPr lang="en-PH" sz="3000" dirty="0"/>
+              <a:t> is used to </a:t>
+            </a:r>
+            <a:r>
+              <a:rPr lang="en-PH" sz="3000" b="1" dirty="0">
+                <a:solidFill>
+                  <a:srgbClr val="00B0F0"/>
+                </a:solidFill>
+              </a:rPr>
+              <a:t>convert text data into numerical form</a:t>
+            </a:r>
+            <a:r>
+              <a:rPr lang="en-PH" sz="3000" dirty="0"/>
+              <a:t>. </a:t>
+            </a:r>
+          </a:p>
+          <a:p>
+            <a:pPr algn="l"/>
+            <a:endParaRPr lang="en-PH" sz="3000" dirty="0"/>
+          </a:p>
+          <a:p>
+            <a:pPr algn="l"/>
+            <a:r>
+              <a:rPr lang="en-PH" sz="3000" dirty="0"/>
+              <a:t>This creates a bag of words where each word is treated as a separate feature and the count of each word in a given document is used as the value of that feature.</a:t>
+            </a:r>
+          </a:p>
+        </p:txBody>
+      </p:sp>
+    </p:spTree>
+    <p:extLst>
+      <p:ext uri="{BB962C8B-B14F-4D97-AF65-F5344CB8AC3E}">
+        <p14:creationId xmlns:p14="http://schemas.microsoft.com/office/powerpoint/2010/main" val="1803023922"/>
+      </p:ext>
+    </p:extLst>
+  </p:cSld>
+  <p:clrMapOvr>
+    <a:masterClrMapping/>
+  </p:clrMapOvr>
+</p:sld>
+</file>
+
+<file path=ppt/slides/slide12.xml><?xml version="1.0" encoding="utf-8"?>
+<p:sld xmlns:a="http://schemas.openxmlformats.org/drawingml/2006/main" xmlns:r="http://schemas.openxmlformats.org/officeDocument/2006/relationships" xmlns:p="http://schemas.openxmlformats.org/presentationml/2006/main">
+  <p:cSld>
+    <p:bg>
+      <p:bgPr>
+        <a:blipFill dpi="0" rotWithShape="1">
+          <a:blip r:embed="rId3">
+            <a:alphaModFix amt="99000"/>
+            <a:lum/>
+          </a:blip>
+          <a:srcRect/>
+          <a:stretch>
+            <a:fillRect t="89000" r="85000" b="-1000"/>
+          </a:stretch>
+        </a:blipFill>
+        <a:effectLst/>
+      </p:bgPr>
+    </p:bg>
+    <p:spTree>
+      <p:nvGrpSpPr>
+        <p:cNvPr id="1" name=""/>
+        <p:cNvGrpSpPr/>
+        <p:nvPr/>
+      </p:nvGrpSpPr>
+      <p:grpSpPr>
+        <a:xfrm>
+          <a:off x="0" y="0"/>
+          <a:ext cx="0" cy="0"/>
+          <a:chOff x="0" y="0"/>
+          <a:chExt cx="0" cy="0"/>
+        </a:xfrm>
+      </p:grpSpPr>
+      <p:sp>
+        <p:nvSpPr>
+          <p:cNvPr id="4" name="Footer Placeholder 3">
+            <a:extLst>
+              <a:ext uri="{FF2B5EF4-FFF2-40B4-BE49-F238E27FC236}">
+                <a16:creationId xmlns:a16="http://schemas.microsoft.com/office/drawing/2014/main" id="{638E7DE1-45EE-476A-A474-0F3C264AEDA3}"/>
+              </a:ext>
+            </a:extLst>
+          </p:cNvPr>
+          <p:cNvSpPr>
+            <a:spLocks noGrp="1"/>
+          </p:cNvSpPr>
+          <p:nvPr>
+            <p:ph type="ftr" sz="quarter" idx="11"/>
+          </p:nvPr>
+        </p:nvSpPr>
+        <p:spPr>
+          <a:xfrm>
+            <a:off x="0" y="6139541"/>
+            <a:ext cx="12192000" cy="718459"/>
+          </a:xfrm>
+          <a:ln w="28575">
+            <a:solidFill>
+              <a:schemeClr val="accent5">
+                <a:lumMod val="50000"/>
+              </a:schemeClr>
+            </a:solidFill>
+          </a:ln>
+        </p:spPr>
+        <p:txBody>
+          <a:bodyPr/>
+          <a:lstStyle/>
+          <a:p>
+            <a:pPr algn="r"/>
+            <a:r>
+              <a:rPr lang="en-US" b="1">
+                <a:solidFill>
+                  <a:schemeClr val="tx1"/>
+                </a:solidFill>
+              </a:rPr>
+              <a:t>CCMACLRL</a:t>
+            </a:r>
+            <a:endParaRPr lang="en-PH" dirty="0"/>
+          </a:p>
+        </p:txBody>
+      </p:sp>
+      <p:sp>
+        <p:nvSpPr>
+          <p:cNvPr id="38" name="Title 1">
+            <a:extLst>
+              <a:ext uri="{FF2B5EF4-FFF2-40B4-BE49-F238E27FC236}">
+                <a16:creationId xmlns:a16="http://schemas.microsoft.com/office/drawing/2014/main" id="{34FAC5F5-ACD5-D061-4054-838F1C03E334}"/>
+              </a:ext>
+            </a:extLst>
+          </p:cNvPr>
+          <p:cNvSpPr>
+            <a:spLocks noGrp="1"/>
+          </p:cNvSpPr>
+          <p:nvPr>
+            <p:ph type="ctrTitle"/>
+          </p:nvPr>
+        </p:nvSpPr>
+        <p:spPr>
+          <a:xfrm>
+            <a:off x="459204" y="378458"/>
+            <a:ext cx="11273589" cy="718459"/>
+          </a:xfrm>
+        </p:spPr>
+        <p:txBody>
+          <a:bodyPr>
+            <a:noAutofit/>
+          </a:bodyPr>
+          <a:lstStyle/>
+          <a:p>
+            <a:r>
+              <a:rPr lang="en-GB" sz="5000" b="1" dirty="0"/>
+              <a:t>Count Vectorizer</a:t>
+            </a:r>
+            <a:endParaRPr lang="en-PH" sz="5000" b="1" dirty="0"/>
+          </a:p>
+        </p:txBody>
+      </p:sp>
+      <p:sp>
+        <p:nvSpPr>
           <p:cNvPr id="3" name="TextBox 2">
             <a:extLst>
               <a:ext uri="{FF2B5EF4-FFF2-40B4-BE49-F238E27FC236}">
@@ -6759,7 +7599,7 @@
 </p:sld>
 </file>
 
-<file path=ppt/slides/slide12.xml><?xml version="1.0" encoding="utf-8"?>
+<file path=ppt/slides/slide13.xml><?xml version="1.0" encoding="utf-8"?>
 <p:sld xmlns:a="http://schemas.openxmlformats.org/drawingml/2006/main" xmlns:r="http://schemas.openxmlformats.org/officeDocument/2006/relationships" xmlns:p="http://schemas.openxmlformats.org/presentationml/2006/main">
   <p:cSld>
     <p:bg>
@@ -7144,7 +7984,7 @@
 </p:sld>
 </file>
 
-<file path=ppt/slides/slide13.xml><?xml version="1.0" encoding="utf-8"?>
+<file path=ppt/slides/slide14.xml><?xml version="1.0" encoding="utf-8"?>
 <p:sld xmlns:a="http://schemas.openxmlformats.org/drawingml/2006/main" xmlns:r="http://schemas.openxmlformats.org/officeDocument/2006/relationships" xmlns:p="http://schemas.openxmlformats.org/presentationml/2006/main">
   <p:cSld>
     <p:bg>
@@ -7477,7 +8317,7 @@
 </p:sld>
 </file>
 
-<file path=ppt/slides/slide14.xml><?xml version="1.0" encoding="utf-8"?>
+<file path=ppt/slides/slide15.xml><?xml version="1.0" encoding="utf-8"?>
 <p:sld xmlns:a="http://schemas.openxmlformats.org/drawingml/2006/main" xmlns:r="http://schemas.openxmlformats.org/officeDocument/2006/relationships" xmlns:p="http://schemas.openxmlformats.org/presentationml/2006/main">
   <p:cSld>
     <p:bg>
@@ -7965,201 +8805,6 @@
 </p:sld>
 </file>
 
-<file path=ppt/slides/slide15.xml><?xml version="1.0" encoding="utf-8"?>
-<p:sld xmlns:a="http://schemas.openxmlformats.org/drawingml/2006/main" xmlns:r="http://schemas.openxmlformats.org/officeDocument/2006/relationships" xmlns:p="http://schemas.openxmlformats.org/presentationml/2006/main">
-  <p:cSld>
-    <p:bg>
-      <p:bgPr>
-        <a:blipFill dpi="0" rotWithShape="1">
-          <a:blip r:embed="rId3">
-            <a:alphaModFix amt="99000"/>
-            <a:lum/>
-          </a:blip>
-          <a:srcRect/>
-          <a:stretch>
-            <a:fillRect t="89000" r="85000" b="-1000"/>
-          </a:stretch>
-        </a:blipFill>
-        <a:effectLst/>
-      </p:bgPr>
-    </p:bg>
-    <p:spTree>
-      <p:nvGrpSpPr>
-        <p:cNvPr id="1" name=""/>
-        <p:cNvGrpSpPr/>
-        <p:nvPr/>
-      </p:nvGrpSpPr>
-      <p:grpSpPr>
-        <a:xfrm>
-          <a:off x="0" y="0"/>
-          <a:ext cx="0" cy="0"/>
-          <a:chOff x="0" y="0"/>
-          <a:chExt cx="0" cy="0"/>
-        </a:xfrm>
-      </p:grpSpPr>
-      <p:sp>
-        <p:nvSpPr>
-          <p:cNvPr id="4" name="Footer Placeholder 3">
-            <a:extLst>
-              <a:ext uri="{FF2B5EF4-FFF2-40B4-BE49-F238E27FC236}">
-                <a16:creationId xmlns:a16="http://schemas.microsoft.com/office/drawing/2014/main" id="{638E7DE1-45EE-476A-A474-0F3C264AEDA3}"/>
-              </a:ext>
-            </a:extLst>
-          </p:cNvPr>
-          <p:cNvSpPr>
-            <a:spLocks noGrp="1"/>
-          </p:cNvSpPr>
-          <p:nvPr>
-            <p:ph type="ftr" sz="quarter" idx="11"/>
-          </p:nvPr>
-        </p:nvSpPr>
-        <p:spPr>
-          <a:xfrm>
-            <a:off x="0" y="6139541"/>
-            <a:ext cx="12192000" cy="718459"/>
-          </a:xfrm>
-          <a:ln w="28575">
-            <a:solidFill>
-              <a:schemeClr val="accent5">
-                <a:lumMod val="50000"/>
-              </a:schemeClr>
-            </a:solidFill>
-          </a:ln>
-        </p:spPr>
-        <p:txBody>
-          <a:bodyPr/>
-          <a:lstStyle/>
-          <a:p>
-            <a:pPr algn="r"/>
-            <a:r>
-              <a:rPr lang="en-US" b="1">
-                <a:solidFill>
-                  <a:schemeClr val="tx1"/>
-                </a:solidFill>
-              </a:rPr>
-              <a:t>CCMACLRL</a:t>
-            </a:r>
-            <a:endParaRPr lang="en-PH" dirty="0"/>
-          </a:p>
-        </p:txBody>
-      </p:sp>
-      <p:sp>
-        <p:nvSpPr>
-          <p:cNvPr id="38" name="Title 1">
-            <a:extLst>
-              <a:ext uri="{FF2B5EF4-FFF2-40B4-BE49-F238E27FC236}">
-                <a16:creationId xmlns:a16="http://schemas.microsoft.com/office/drawing/2014/main" id="{34FAC5F5-ACD5-D061-4054-838F1C03E334}"/>
-              </a:ext>
-            </a:extLst>
-          </p:cNvPr>
-          <p:cNvSpPr>
-            <a:spLocks noGrp="1"/>
-          </p:cNvSpPr>
-          <p:nvPr>
-            <p:ph type="ctrTitle"/>
-          </p:nvPr>
-        </p:nvSpPr>
-        <p:spPr>
-          <a:xfrm>
-            <a:off x="459204" y="378458"/>
-            <a:ext cx="11273589" cy="718459"/>
-          </a:xfrm>
-        </p:spPr>
-        <p:txBody>
-          <a:bodyPr>
-            <a:noAutofit/>
-          </a:bodyPr>
-          <a:lstStyle/>
-          <a:p>
-            <a:r>
-              <a:rPr lang="en-GB" sz="5000" b="1" dirty="0"/>
-              <a:t>TF-IDF Vectorizer</a:t>
-            </a:r>
-            <a:endParaRPr lang="en-PH" sz="5000" b="1" dirty="0"/>
-          </a:p>
-        </p:txBody>
-      </p:sp>
-      <p:sp>
-        <p:nvSpPr>
-          <p:cNvPr id="6" name="TextBox 5">
-            <a:extLst>
-              <a:ext uri="{FF2B5EF4-FFF2-40B4-BE49-F238E27FC236}">
-                <a16:creationId xmlns:a16="http://schemas.microsoft.com/office/drawing/2014/main" id="{5E5DC7C9-6A45-A3E2-F421-2A25E3B5F5E1}"/>
-              </a:ext>
-            </a:extLst>
-          </p:cNvPr>
-          <p:cNvSpPr txBox="1"/>
-          <p:nvPr/>
-        </p:nvSpPr>
-        <p:spPr>
-          <a:xfrm>
-            <a:off x="459203" y="1368125"/>
-            <a:ext cx="11273589" cy="2862322"/>
-          </a:xfrm>
-          <a:prstGeom prst="rect">
-            <a:avLst/>
-          </a:prstGeom>
-          <a:noFill/>
-        </p:spPr>
-        <p:txBody>
-          <a:bodyPr wrap="square">
-            <a:spAutoFit/>
-          </a:bodyPr>
-          <a:lstStyle/>
-          <a:p>
-            <a:pPr algn="l"/>
-            <a:r>
-              <a:rPr lang="en-PH" sz="3000" b="1" dirty="0"/>
-              <a:t>TD-IDF Vectorizer </a:t>
-            </a:r>
-            <a:r>
-              <a:rPr lang="en-PH" sz="3000" dirty="0"/>
-              <a:t>is also used to </a:t>
-            </a:r>
-            <a:r>
-              <a:rPr lang="en-PH" sz="3000" b="1" dirty="0">
-                <a:solidFill>
-                  <a:srgbClr val="00B0F0"/>
-                </a:solidFill>
-              </a:rPr>
-              <a:t>convert text data into numerical form</a:t>
-            </a:r>
-            <a:r>
-              <a:rPr lang="en-PH" sz="3000" dirty="0"/>
-              <a:t>. </a:t>
-            </a:r>
-          </a:p>
-          <a:p>
-            <a:pPr algn="l"/>
-            <a:endParaRPr lang="en-PH" sz="3000" dirty="0"/>
-          </a:p>
-          <a:p>
-            <a:pPr algn="l"/>
-            <a:r>
-              <a:rPr lang="en-US" sz="3000" b="1" dirty="0"/>
-              <a:t>TF-IDF Vectorizer </a:t>
-            </a:r>
-            <a:r>
-              <a:rPr lang="en-US" sz="3000" dirty="0"/>
-              <a:t>not only counts the frequency of each word but also assigns a weight to each word based on its frequency in the document and its frequency in the entire corpus</a:t>
-            </a:r>
-            <a:endParaRPr lang="en-PH" sz="3000" dirty="0"/>
-          </a:p>
-        </p:txBody>
-      </p:sp>
-    </p:spTree>
-    <p:extLst>
-      <p:ext uri="{BB962C8B-B14F-4D97-AF65-F5344CB8AC3E}">
-        <p14:creationId xmlns:p14="http://schemas.microsoft.com/office/powerpoint/2010/main" val="2900838616"/>
-      </p:ext>
-    </p:extLst>
-  </p:cSld>
-  <p:clrMapOvr>
-    <a:masterClrMapping/>
-  </p:clrMapOvr>
-</p:sld>
-</file>
-
 <file path=ppt/slides/slide16.xml><?xml version="1.0" encoding="utf-8"?>
 <p:sld xmlns:a="http://schemas.openxmlformats.org/drawingml/2006/main" xmlns:r="http://schemas.openxmlformats.org/officeDocument/2006/relationships" xmlns:p="http://schemas.openxmlformats.org/presentationml/2006/main">
   <p:cSld>
@@ -8225,6 +8870,201 @@
           <a:bodyPr/>
           <a:lstStyle/>
           <a:p>
+            <a:pPr algn="r"/>
+            <a:r>
+              <a:rPr lang="en-US" b="1">
+                <a:solidFill>
+                  <a:schemeClr val="tx1"/>
+                </a:solidFill>
+              </a:rPr>
+              <a:t>CCMACLRL</a:t>
+            </a:r>
+            <a:endParaRPr lang="en-PH" dirty="0"/>
+          </a:p>
+        </p:txBody>
+      </p:sp>
+      <p:sp>
+        <p:nvSpPr>
+          <p:cNvPr id="38" name="Title 1">
+            <a:extLst>
+              <a:ext uri="{FF2B5EF4-FFF2-40B4-BE49-F238E27FC236}">
+                <a16:creationId xmlns:a16="http://schemas.microsoft.com/office/drawing/2014/main" id="{34FAC5F5-ACD5-D061-4054-838F1C03E334}"/>
+              </a:ext>
+            </a:extLst>
+          </p:cNvPr>
+          <p:cNvSpPr>
+            <a:spLocks noGrp="1"/>
+          </p:cNvSpPr>
+          <p:nvPr>
+            <p:ph type="ctrTitle"/>
+          </p:nvPr>
+        </p:nvSpPr>
+        <p:spPr>
+          <a:xfrm>
+            <a:off x="459204" y="378458"/>
+            <a:ext cx="11273589" cy="718459"/>
+          </a:xfrm>
+        </p:spPr>
+        <p:txBody>
+          <a:bodyPr>
+            <a:noAutofit/>
+          </a:bodyPr>
+          <a:lstStyle/>
+          <a:p>
+            <a:r>
+              <a:rPr lang="en-GB" sz="5000" b="1" dirty="0"/>
+              <a:t>TF-IDF Vectorizer</a:t>
+            </a:r>
+            <a:endParaRPr lang="en-PH" sz="5000" b="1" dirty="0"/>
+          </a:p>
+        </p:txBody>
+      </p:sp>
+      <p:sp>
+        <p:nvSpPr>
+          <p:cNvPr id="6" name="TextBox 5">
+            <a:extLst>
+              <a:ext uri="{FF2B5EF4-FFF2-40B4-BE49-F238E27FC236}">
+                <a16:creationId xmlns:a16="http://schemas.microsoft.com/office/drawing/2014/main" id="{5E5DC7C9-6A45-A3E2-F421-2A25E3B5F5E1}"/>
+              </a:ext>
+            </a:extLst>
+          </p:cNvPr>
+          <p:cNvSpPr txBox="1"/>
+          <p:nvPr/>
+        </p:nvSpPr>
+        <p:spPr>
+          <a:xfrm>
+            <a:off x="459203" y="1368125"/>
+            <a:ext cx="11273589" cy="2862322"/>
+          </a:xfrm>
+          <a:prstGeom prst="rect">
+            <a:avLst/>
+          </a:prstGeom>
+          <a:noFill/>
+        </p:spPr>
+        <p:txBody>
+          <a:bodyPr wrap="square">
+            <a:spAutoFit/>
+          </a:bodyPr>
+          <a:lstStyle/>
+          <a:p>
+            <a:pPr algn="l"/>
+            <a:r>
+              <a:rPr lang="en-PH" sz="3000" b="1" dirty="0"/>
+              <a:t>TD-IDF Vectorizer </a:t>
+            </a:r>
+            <a:r>
+              <a:rPr lang="en-PH" sz="3000" dirty="0"/>
+              <a:t>is also used to </a:t>
+            </a:r>
+            <a:r>
+              <a:rPr lang="en-PH" sz="3000" b="1" dirty="0">
+                <a:solidFill>
+                  <a:srgbClr val="00B0F0"/>
+                </a:solidFill>
+              </a:rPr>
+              <a:t>convert text data into numerical form</a:t>
+            </a:r>
+            <a:r>
+              <a:rPr lang="en-PH" sz="3000" dirty="0"/>
+              <a:t>. </a:t>
+            </a:r>
+          </a:p>
+          <a:p>
+            <a:pPr algn="l"/>
+            <a:endParaRPr lang="en-PH" sz="3000" dirty="0"/>
+          </a:p>
+          <a:p>
+            <a:pPr algn="l"/>
+            <a:r>
+              <a:rPr lang="en-US" sz="3000" b="1" dirty="0"/>
+              <a:t>TF-IDF Vectorizer </a:t>
+            </a:r>
+            <a:r>
+              <a:rPr lang="en-US" sz="3000" dirty="0"/>
+              <a:t>not only counts the frequency of each word but also assigns a weight to each word based on its frequency in the document and its frequency in the entire corpus</a:t>
+            </a:r>
+            <a:endParaRPr lang="en-PH" sz="3000" dirty="0"/>
+          </a:p>
+        </p:txBody>
+      </p:sp>
+    </p:spTree>
+    <p:extLst>
+      <p:ext uri="{BB962C8B-B14F-4D97-AF65-F5344CB8AC3E}">
+        <p14:creationId xmlns:p14="http://schemas.microsoft.com/office/powerpoint/2010/main" val="2900838616"/>
+      </p:ext>
+    </p:extLst>
+  </p:cSld>
+  <p:clrMapOvr>
+    <a:masterClrMapping/>
+  </p:clrMapOvr>
+</p:sld>
+</file>
+
+<file path=ppt/slides/slide17.xml><?xml version="1.0" encoding="utf-8"?>
+<p:sld xmlns:a="http://schemas.openxmlformats.org/drawingml/2006/main" xmlns:r="http://schemas.openxmlformats.org/officeDocument/2006/relationships" xmlns:p="http://schemas.openxmlformats.org/presentationml/2006/main">
+  <p:cSld>
+    <p:bg>
+      <p:bgPr>
+        <a:blipFill dpi="0" rotWithShape="1">
+          <a:blip r:embed="rId3">
+            <a:alphaModFix amt="99000"/>
+            <a:lum/>
+          </a:blip>
+          <a:srcRect/>
+          <a:stretch>
+            <a:fillRect t="89000" r="85000" b="-1000"/>
+          </a:stretch>
+        </a:blipFill>
+        <a:effectLst/>
+      </p:bgPr>
+    </p:bg>
+    <p:spTree>
+      <p:nvGrpSpPr>
+        <p:cNvPr id="1" name=""/>
+        <p:cNvGrpSpPr/>
+        <p:nvPr/>
+      </p:nvGrpSpPr>
+      <p:grpSpPr>
+        <a:xfrm>
+          <a:off x="0" y="0"/>
+          <a:ext cx="0" cy="0"/>
+          <a:chOff x="0" y="0"/>
+          <a:chExt cx="0" cy="0"/>
+        </a:xfrm>
+      </p:grpSpPr>
+      <p:sp>
+        <p:nvSpPr>
+          <p:cNvPr id="4" name="Footer Placeholder 3">
+            <a:extLst>
+              <a:ext uri="{FF2B5EF4-FFF2-40B4-BE49-F238E27FC236}">
+                <a16:creationId xmlns:a16="http://schemas.microsoft.com/office/drawing/2014/main" id="{638E7DE1-45EE-476A-A474-0F3C264AEDA3}"/>
+              </a:ext>
+            </a:extLst>
+          </p:cNvPr>
+          <p:cNvSpPr>
+            <a:spLocks noGrp="1"/>
+          </p:cNvSpPr>
+          <p:nvPr>
+            <p:ph type="ftr" sz="quarter" idx="11"/>
+          </p:nvPr>
+        </p:nvSpPr>
+        <p:spPr>
+          <a:xfrm>
+            <a:off x="0" y="6139541"/>
+            <a:ext cx="12192000" cy="718459"/>
+          </a:xfrm>
+          <a:ln w="28575">
+            <a:solidFill>
+              <a:schemeClr val="accent5">
+                <a:lumMod val="50000"/>
+              </a:schemeClr>
+            </a:solidFill>
+          </a:ln>
+        </p:spPr>
+        <p:txBody>
+          <a:bodyPr/>
+          <a:lstStyle/>
+          <a:p>
             <a:r>
               <a:rPr lang="en-US" b="1">
                 <a:solidFill>
@@ -8380,7 +9220,7 @@
 </p:sld>
 </file>
 
-<file path=ppt/slides/slide17.xml><?xml version="1.0" encoding="utf-8"?>
+<file path=ppt/slides/slide18.xml><?xml version="1.0" encoding="utf-8"?>
 <p:sld xmlns:a="http://schemas.openxmlformats.org/drawingml/2006/main" xmlns:r="http://schemas.openxmlformats.org/officeDocument/2006/relationships" xmlns:p="http://schemas.openxmlformats.org/presentationml/2006/main">
   <p:cSld>
     <p:bg>
@@ -8640,7 +9480,7 @@
 </p:sld>
 </file>
 
-<file path=ppt/slides/slide18.xml><?xml version="1.0" encoding="utf-8"?>
+<file path=ppt/slides/slide19.xml><?xml version="1.0" encoding="utf-8"?>
 <p:sld xmlns:a="http://schemas.openxmlformats.org/drawingml/2006/main" xmlns:r="http://schemas.openxmlformats.org/officeDocument/2006/relationships" xmlns:p="http://schemas.openxmlformats.org/presentationml/2006/main">
   <p:cSld>
     <p:bg>
@@ -8972,401 +9812,6 @@
     <p:extLst>
       <p:ext uri="{BB962C8B-B14F-4D97-AF65-F5344CB8AC3E}">
         <p14:creationId xmlns:p14="http://schemas.microsoft.com/office/powerpoint/2010/main" val="3735786492"/>
-      </p:ext>
-    </p:extLst>
-  </p:cSld>
-  <p:clrMapOvr>
-    <a:masterClrMapping/>
-  </p:clrMapOvr>
-</p:sld>
-</file>
-
-<file path=ppt/slides/slide19.xml><?xml version="1.0" encoding="utf-8"?>
-<p:sld xmlns:a="http://schemas.openxmlformats.org/drawingml/2006/main" xmlns:r="http://schemas.openxmlformats.org/officeDocument/2006/relationships" xmlns:p="http://schemas.openxmlformats.org/presentationml/2006/main">
-  <p:cSld>
-    <p:bg>
-      <p:bgPr>
-        <a:blipFill dpi="0" rotWithShape="1">
-          <a:blip r:embed="rId3">
-            <a:alphaModFix amt="99000"/>
-            <a:lum/>
-          </a:blip>
-          <a:srcRect/>
-          <a:stretch>
-            <a:fillRect t="89000" r="85000" b="-1000"/>
-          </a:stretch>
-        </a:blipFill>
-        <a:effectLst/>
-      </p:bgPr>
-    </p:bg>
-    <p:spTree>
-      <p:nvGrpSpPr>
-        <p:cNvPr id="1" name=""/>
-        <p:cNvGrpSpPr/>
-        <p:nvPr/>
-      </p:nvGrpSpPr>
-      <p:grpSpPr>
-        <a:xfrm>
-          <a:off x="0" y="0"/>
-          <a:ext cx="0" cy="0"/>
-          <a:chOff x="0" y="0"/>
-          <a:chExt cx="0" cy="0"/>
-        </a:xfrm>
-      </p:grpSpPr>
-      <p:sp>
-        <p:nvSpPr>
-          <p:cNvPr id="4" name="Footer Placeholder 3">
-            <a:extLst>
-              <a:ext uri="{FF2B5EF4-FFF2-40B4-BE49-F238E27FC236}">
-                <a16:creationId xmlns:a16="http://schemas.microsoft.com/office/drawing/2014/main" id="{638E7DE1-45EE-476A-A474-0F3C264AEDA3}"/>
-              </a:ext>
-            </a:extLst>
-          </p:cNvPr>
-          <p:cNvSpPr>
-            <a:spLocks noGrp="1"/>
-          </p:cNvSpPr>
-          <p:nvPr>
-            <p:ph type="ftr" sz="quarter" idx="11"/>
-          </p:nvPr>
-        </p:nvSpPr>
-        <p:spPr>
-          <a:xfrm>
-            <a:off x="0" y="6139541"/>
-            <a:ext cx="12192000" cy="718459"/>
-          </a:xfrm>
-          <a:ln w="28575">
-            <a:solidFill>
-              <a:schemeClr val="accent5">
-                <a:lumMod val="50000"/>
-              </a:schemeClr>
-            </a:solidFill>
-          </a:ln>
-        </p:spPr>
-        <p:txBody>
-          <a:bodyPr/>
-          <a:lstStyle/>
-          <a:p>
-            <a:pPr algn="r"/>
-            <a:r>
-              <a:rPr lang="en-US" b="1">
-                <a:solidFill>
-                  <a:schemeClr val="tx1"/>
-                </a:solidFill>
-              </a:rPr>
-              <a:t>CCMACLRL</a:t>
-            </a:r>
-            <a:endParaRPr lang="en-PH" dirty="0"/>
-          </a:p>
-        </p:txBody>
-      </p:sp>
-      <p:sp>
-        <p:nvSpPr>
-          <p:cNvPr id="38" name="Title 1">
-            <a:extLst>
-              <a:ext uri="{FF2B5EF4-FFF2-40B4-BE49-F238E27FC236}">
-                <a16:creationId xmlns:a16="http://schemas.microsoft.com/office/drawing/2014/main" id="{34FAC5F5-ACD5-D061-4054-838F1C03E334}"/>
-              </a:ext>
-            </a:extLst>
-          </p:cNvPr>
-          <p:cNvSpPr>
-            <a:spLocks noGrp="1"/>
-          </p:cNvSpPr>
-          <p:nvPr>
-            <p:ph type="ctrTitle"/>
-          </p:nvPr>
-        </p:nvSpPr>
-        <p:spPr>
-          <a:xfrm>
-            <a:off x="459204" y="378458"/>
-            <a:ext cx="11273589" cy="718459"/>
-          </a:xfrm>
-        </p:spPr>
-        <p:txBody>
-          <a:bodyPr>
-            <a:noAutofit/>
-          </a:bodyPr>
-          <a:lstStyle/>
-          <a:p>
-            <a:r>
-              <a:rPr lang="en-GB" sz="5000" b="1" dirty="0"/>
-              <a:t>TF-IDF Vectorizer</a:t>
-            </a:r>
-            <a:endParaRPr lang="en-PH" sz="5000" b="1" dirty="0"/>
-          </a:p>
-        </p:txBody>
-      </p:sp>
-      <p:graphicFrame>
-        <p:nvGraphicFramePr>
-          <p:cNvPr id="5" name="Table 4">
-            <a:extLst>
-              <a:ext uri="{FF2B5EF4-FFF2-40B4-BE49-F238E27FC236}">
-                <a16:creationId xmlns:a16="http://schemas.microsoft.com/office/drawing/2014/main" id="{E9A25983-C77E-5751-FC57-7CBFCBD3BB34}"/>
-              </a:ext>
-            </a:extLst>
-          </p:cNvPr>
-          <p:cNvGraphicFramePr>
-            <a:graphicFrameLocks noGrp="1"/>
-          </p:cNvGraphicFramePr>
-          <p:nvPr/>
-        </p:nvGraphicFramePr>
-        <p:xfrm>
-          <a:off x="2031998" y="2632345"/>
-          <a:ext cx="8128000" cy="2194560"/>
-        </p:xfrm>
-        <a:graphic>
-          <a:graphicData uri="http://schemas.openxmlformats.org/drawingml/2006/table">
-            <a:tbl>
-              <a:tblPr firstRow="1" bandRow="1">
-                <a:tableStyleId>{5940675A-B579-460E-94D1-54222C63F5DA}</a:tableStyleId>
-              </a:tblPr>
-              <a:tblGrid>
-                <a:gridCol w="4064000">
-                  <a:extLst>
-                    <a:ext uri="{9D8B030D-6E8A-4147-A177-3AD203B41FA5}">
-                      <a16:colId xmlns:a16="http://schemas.microsoft.com/office/drawing/2014/main" val="433140506"/>
-                    </a:ext>
-                  </a:extLst>
-                </a:gridCol>
-                <a:gridCol w="4064000">
-                  <a:extLst>
-                    <a:ext uri="{9D8B030D-6E8A-4147-A177-3AD203B41FA5}">
-                      <a16:colId xmlns:a16="http://schemas.microsoft.com/office/drawing/2014/main" val="2123350326"/>
-                    </a:ext>
-                  </a:extLst>
-                </a:gridCol>
-              </a:tblGrid>
-              <a:tr h="370840">
-                <a:tc>
-                  <a:txBody>
-                    <a:bodyPr/>
-                    <a:lstStyle/>
-                    <a:p>
-                      <a:pPr algn="ctr"/>
-                      <a:endParaRPr lang="en-PH" b="1">
-                        <a:solidFill>
-                          <a:schemeClr val="bg1"/>
-                        </a:solidFill>
-                      </a:endParaRPr>
-                    </a:p>
-                  </a:txBody>
-                  <a:tcPr>
-                    <a:solidFill>
-                      <a:schemeClr val="tx1"/>
-                    </a:solidFill>
-                  </a:tcPr>
-                </a:tc>
-                <a:tc>
-                  <a:txBody>
-                    <a:bodyPr/>
-                    <a:lstStyle/>
-                    <a:p>
-                      <a:pPr algn="ctr"/>
-                      <a:r>
-                        <a:rPr lang="en-US" sz="3000" b="1" dirty="0">
-                          <a:solidFill>
-                            <a:schemeClr val="bg1"/>
-                          </a:solidFill>
-                        </a:rPr>
-                        <a:t>Document</a:t>
-                      </a:r>
-                      <a:endParaRPr lang="en-PH" sz="3000" b="1" dirty="0">
-                        <a:solidFill>
-                          <a:schemeClr val="bg1"/>
-                        </a:solidFill>
-                      </a:endParaRPr>
-                    </a:p>
-                  </a:txBody>
-                  <a:tcPr>
-                    <a:solidFill>
-                      <a:schemeClr val="tx1"/>
-                    </a:solidFill>
-                  </a:tcPr>
-                </a:tc>
-                <a:extLst>
-                  <a:ext uri="{0D108BD9-81ED-4DB2-BD59-A6C34878D82A}">
-                    <a16:rowId xmlns:a16="http://schemas.microsoft.com/office/drawing/2014/main" val="3525947850"/>
-                  </a:ext>
-                </a:extLst>
-              </a:tr>
-              <a:tr h="370840">
-                <a:tc>
-                  <a:txBody>
-                    <a:bodyPr/>
-                    <a:lstStyle/>
-                    <a:p>
-                      <a:pPr algn="ctr"/>
-                      <a:r>
-                        <a:rPr lang="en-US" sz="3000" dirty="0"/>
-                        <a:t>0</a:t>
-                      </a:r>
-                      <a:endParaRPr lang="en-PH" sz="3000" dirty="0"/>
-                    </a:p>
-                  </a:txBody>
-                  <a:tcPr anchor="ctr"/>
-                </a:tc>
-                <a:tc>
-                  <a:txBody>
-                    <a:bodyPr/>
-                    <a:lstStyle/>
-                    <a:p>
-                      <a:pPr algn="ctr"/>
-                      <a:r>
-                        <a:rPr lang="en-US" altLang="en-US" sz="3000" dirty="0"/>
-                        <a:t>go rain today</a:t>
-                      </a:r>
-                      <a:endParaRPr lang="en-PH" sz="3000" dirty="0"/>
-                    </a:p>
-                  </a:txBody>
-                  <a:tcPr anchor="ctr"/>
-                </a:tc>
-                <a:extLst>
-                  <a:ext uri="{0D108BD9-81ED-4DB2-BD59-A6C34878D82A}">
-                    <a16:rowId xmlns:a16="http://schemas.microsoft.com/office/drawing/2014/main" val="817878137"/>
-                  </a:ext>
-                </a:extLst>
-              </a:tr>
-              <a:tr h="370840">
-                <a:tc>
-                  <a:txBody>
-                    <a:bodyPr/>
-                    <a:lstStyle/>
-                    <a:p>
-                      <a:pPr algn="ctr"/>
-                      <a:r>
-                        <a:rPr lang="en-US" sz="3000" dirty="0"/>
-                        <a:t>1</a:t>
-                      </a:r>
-                      <a:endParaRPr lang="en-PH" sz="3000" dirty="0"/>
-                    </a:p>
-                  </a:txBody>
-                  <a:tcPr anchor="ctr"/>
-                </a:tc>
-                <a:tc>
-                  <a:txBody>
-                    <a:bodyPr/>
-                    <a:lstStyle/>
-                    <a:p>
-                      <a:pPr algn="ctr"/>
-                      <a:r>
-                        <a:rPr lang="en-US" sz="3000" dirty="0"/>
-                        <a:t>go office today</a:t>
-                      </a:r>
-                      <a:endParaRPr lang="en-PH" sz="3000" dirty="0"/>
-                    </a:p>
-                  </a:txBody>
-                  <a:tcPr anchor="ctr"/>
-                </a:tc>
-                <a:extLst>
-                  <a:ext uri="{0D108BD9-81ED-4DB2-BD59-A6C34878D82A}">
-                    <a16:rowId xmlns:a16="http://schemas.microsoft.com/office/drawing/2014/main" val="1529500225"/>
-                  </a:ext>
-                </a:extLst>
-              </a:tr>
-              <a:tr h="370840">
-                <a:tc>
-                  <a:txBody>
-                    <a:bodyPr/>
-                    <a:lstStyle/>
-                    <a:p>
-                      <a:pPr algn="ctr"/>
-                      <a:r>
-                        <a:rPr lang="en-US" sz="3000" dirty="0"/>
-                        <a:t>2</a:t>
-                      </a:r>
-                      <a:endParaRPr lang="en-PH" sz="3000" dirty="0"/>
-                    </a:p>
-                  </a:txBody>
-                  <a:tcPr anchor="ctr"/>
-                </a:tc>
-                <a:tc>
-                  <a:txBody>
-                    <a:bodyPr/>
-                    <a:lstStyle/>
-                    <a:p>
-                      <a:pPr algn="ctr"/>
-                      <a:r>
-                        <a:rPr lang="en-US" altLang="en-US" sz="3000" dirty="0"/>
-                        <a:t>go watch match</a:t>
-                      </a:r>
-                      <a:endParaRPr lang="en-PH" sz="3000" dirty="0"/>
-                    </a:p>
-                  </a:txBody>
-                  <a:tcPr anchor="ctr"/>
-                </a:tc>
-                <a:extLst>
-                  <a:ext uri="{0D108BD9-81ED-4DB2-BD59-A6C34878D82A}">
-                    <a16:rowId xmlns:a16="http://schemas.microsoft.com/office/drawing/2014/main" val="3614435626"/>
-                  </a:ext>
-                </a:extLst>
-              </a:tr>
-            </a:tbl>
-          </a:graphicData>
-        </a:graphic>
-      </p:graphicFrame>
-      <p:sp>
-        <p:nvSpPr>
-          <p:cNvPr id="2" name="TextBox 1">
-            <a:extLst>
-              <a:ext uri="{FF2B5EF4-FFF2-40B4-BE49-F238E27FC236}">
-                <a16:creationId xmlns:a16="http://schemas.microsoft.com/office/drawing/2014/main" id="{900F0F4D-EFB1-2224-9A2B-4474B7678423}"/>
-              </a:ext>
-            </a:extLst>
-          </p:cNvPr>
-          <p:cNvSpPr txBox="1"/>
-          <p:nvPr/>
-        </p:nvSpPr>
-        <p:spPr>
-          <a:xfrm>
-            <a:off x="459203" y="1440151"/>
-            <a:ext cx="11273589" cy="477054"/>
-          </a:xfrm>
-          <a:prstGeom prst="rect">
-            <a:avLst/>
-          </a:prstGeom>
-          <a:noFill/>
-        </p:spPr>
-        <p:txBody>
-          <a:bodyPr wrap="square">
-            <a:spAutoFit/>
-          </a:bodyPr>
-          <a:lstStyle/>
-          <a:p>
-            <a:pPr algn="l"/>
-            <a:r>
-              <a:rPr lang="en-US" sz="2500" dirty="0"/>
-              <a:t>A</a:t>
-            </a:r>
-            <a:r>
-              <a:rPr lang="en-PH" sz="2500" dirty="0" err="1"/>
-              <a:t>pply</a:t>
-            </a:r>
-            <a:r>
-              <a:rPr lang="en-PH" sz="2500" dirty="0"/>
-              <a:t> </a:t>
-            </a:r>
-            <a:r>
-              <a:rPr lang="en-PH" sz="2500" b="1" dirty="0"/>
-              <a:t>stop word removal </a:t>
-            </a:r>
-            <a:r>
-              <a:rPr lang="en-PH" sz="2500" dirty="0"/>
-              <a:t>and </a:t>
-            </a:r>
-            <a:r>
-              <a:rPr lang="en-PH" sz="2500" b="1" dirty="0"/>
-              <a:t>lemmatization</a:t>
-            </a:r>
-            <a:r>
-              <a:rPr lang="en-PH" sz="2500" dirty="0"/>
-              <a:t> before doing TF-IDF Vectorizer</a:t>
-            </a:r>
-          </a:p>
-        </p:txBody>
-      </p:sp>
-    </p:spTree>
-    <p:extLst>
-      <p:ext uri="{BB962C8B-B14F-4D97-AF65-F5344CB8AC3E}">
-        <p14:creationId xmlns:p14="http://schemas.microsoft.com/office/powerpoint/2010/main" val="1048641083"/>
       </p:ext>
     </p:extLst>
   </p:cSld>
@@ -10277,6 +10722,401 @@
       </p:sp>
       <p:graphicFrame>
         <p:nvGraphicFramePr>
+          <p:cNvPr id="5" name="Table 4">
+            <a:extLst>
+              <a:ext uri="{FF2B5EF4-FFF2-40B4-BE49-F238E27FC236}">
+                <a16:creationId xmlns:a16="http://schemas.microsoft.com/office/drawing/2014/main" id="{E9A25983-C77E-5751-FC57-7CBFCBD3BB34}"/>
+              </a:ext>
+            </a:extLst>
+          </p:cNvPr>
+          <p:cNvGraphicFramePr>
+            <a:graphicFrameLocks noGrp="1"/>
+          </p:cNvGraphicFramePr>
+          <p:nvPr/>
+        </p:nvGraphicFramePr>
+        <p:xfrm>
+          <a:off x="2031998" y="2632345"/>
+          <a:ext cx="8128000" cy="2194560"/>
+        </p:xfrm>
+        <a:graphic>
+          <a:graphicData uri="http://schemas.openxmlformats.org/drawingml/2006/table">
+            <a:tbl>
+              <a:tblPr firstRow="1" bandRow="1">
+                <a:tableStyleId>{5940675A-B579-460E-94D1-54222C63F5DA}</a:tableStyleId>
+              </a:tblPr>
+              <a:tblGrid>
+                <a:gridCol w="4064000">
+                  <a:extLst>
+                    <a:ext uri="{9D8B030D-6E8A-4147-A177-3AD203B41FA5}">
+                      <a16:colId xmlns:a16="http://schemas.microsoft.com/office/drawing/2014/main" val="433140506"/>
+                    </a:ext>
+                  </a:extLst>
+                </a:gridCol>
+                <a:gridCol w="4064000">
+                  <a:extLst>
+                    <a:ext uri="{9D8B030D-6E8A-4147-A177-3AD203B41FA5}">
+                      <a16:colId xmlns:a16="http://schemas.microsoft.com/office/drawing/2014/main" val="2123350326"/>
+                    </a:ext>
+                  </a:extLst>
+                </a:gridCol>
+              </a:tblGrid>
+              <a:tr h="370840">
+                <a:tc>
+                  <a:txBody>
+                    <a:bodyPr/>
+                    <a:lstStyle/>
+                    <a:p>
+                      <a:pPr algn="ctr"/>
+                      <a:endParaRPr lang="en-PH" b="1">
+                        <a:solidFill>
+                          <a:schemeClr val="bg1"/>
+                        </a:solidFill>
+                      </a:endParaRPr>
+                    </a:p>
+                  </a:txBody>
+                  <a:tcPr>
+                    <a:solidFill>
+                      <a:schemeClr val="tx1"/>
+                    </a:solidFill>
+                  </a:tcPr>
+                </a:tc>
+                <a:tc>
+                  <a:txBody>
+                    <a:bodyPr/>
+                    <a:lstStyle/>
+                    <a:p>
+                      <a:pPr algn="ctr"/>
+                      <a:r>
+                        <a:rPr lang="en-US" sz="3000" b="1" dirty="0">
+                          <a:solidFill>
+                            <a:schemeClr val="bg1"/>
+                          </a:solidFill>
+                        </a:rPr>
+                        <a:t>Document</a:t>
+                      </a:r>
+                      <a:endParaRPr lang="en-PH" sz="3000" b="1" dirty="0">
+                        <a:solidFill>
+                          <a:schemeClr val="bg1"/>
+                        </a:solidFill>
+                      </a:endParaRPr>
+                    </a:p>
+                  </a:txBody>
+                  <a:tcPr>
+                    <a:solidFill>
+                      <a:schemeClr val="tx1"/>
+                    </a:solidFill>
+                  </a:tcPr>
+                </a:tc>
+                <a:extLst>
+                  <a:ext uri="{0D108BD9-81ED-4DB2-BD59-A6C34878D82A}">
+                    <a16:rowId xmlns:a16="http://schemas.microsoft.com/office/drawing/2014/main" val="3525947850"/>
+                  </a:ext>
+                </a:extLst>
+              </a:tr>
+              <a:tr h="370840">
+                <a:tc>
+                  <a:txBody>
+                    <a:bodyPr/>
+                    <a:lstStyle/>
+                    <a:p>
+                      <a:pPr algn="ctr"/>
+                      <a:r>
+                        <a:rPr lang="en-US" sz="3000" dirty="0"/>
+                        <a:t>0</a:t>
+                      </a:r>
+                      <a:endParaRPr lang="en-PH" sz="3000" dirty="0"/>
+                    </a:p>
+                  </a:txBody>
+                  <a:tcPr anchor="ctr"/>
+                </a:tc>
+                <a:tc>
+                  <a:txBody>
+                    <a:bodyPr/>
+                    <a:lstStyle/>
+                    <a:p>
+                      <a:pPr algn="ctr"/>
+                      <a:r>
+                        <a:rPr lang="en-US" altLang="en-US" sz="3000" dirty="0"/>
+                        <a:t>go rain today</a:t>
+                      </a:r>
+                      <a:endParaRPr lang="en-PH" sz="3000" dirty="0"/>
+                    </a:p>
+                  </a:txBody>
+                  <a:tcPr anchor="ctr"/>
+                </a:tc>
+                <a:extLst>
+                  <a:ext uri="{0D108BD9-81ED-4DB2-BD59-A6C34878D82A}">
+                    <a16:rowId xmlns:a16="http://schemas.microsoft.com/office/drawing/2014/main" val="817878137"/>
+                  </a:ext>
+                </a:extLst>
+              </a:tr>
+              <a:tr h="370840">
+                <a:tc>
+                  <a:txBody>
+                    <a:bodyPr/>
+                    <a:lstStyle/>
+                    <a:p>
+                      <a:pPr algn="ctr"/>
+                      <a:r>
+                        <a:rPr lang="en-US" sz="3000" dirty="0"/>
+                        <a:t>1</a:t>
+                      </a:r>
+                      <a:endParaRPr lang="en-PH" sz="3000" dirty="0"/>
+                    </a:p>
+                  </a:txBody>
+                  <a:tcPr anchor="ctr"/>
+                </a:tc>
+                <a:tc>
+                  <a:txBody>
+                    <a:bodyPr/>
+                    <a:lstStyle/>
+                    <a:p>
+                      <a:pPr algn="ctr"/>
+                      <a:r>
+                        <a:rPr lang="en-US" sz="3000" dirty="0"/>
+                        <a:t>go office today</a:t>
+                      </a:r>
+                      <a:endParaRPr lang="en-PH" sz="3000" dirty="0"/>
+                    </a:p>
+                  </a:txBody>
+                  <a:tcPr anchor="ctr"/>
+                </a:tc>
+                <a:extLst>
+                  <a:ext uri="{0D108BD9-81ED-4DB2-BD59-A6C34878D82A}">
+                    <a16:rowId xmlns:a16="http://schemas.microsoft.com/office/drawing/2014/main" val="1529500225"/>
+                  </a:ext>
+                </a:extLst>
+              </a:tr>
+              <a:tr h="370840">
+                <a:tc>
+                  <a:txBody>
+                    <a:bodyPr/>
+                    <a:lstStyle/>
+                    <a:p>
+                      <a:pPr algn="ctr"/>
+                      <a:r>
+                        <a:rPr lang="en-US" sz="3000" dirty="0"/>
+                        <a:t>2</a:t>
+                      </a:r>
+                      <a:endParaRPr lang="en-PH" sz="3000" dirty="0"/>
+                    </a:p>
+                  </a:txBody>
+                  <a:tcPr anchor="ctr"/>
+                </a:tc>
+                <a:tc>
+                  <a:txBody>
+                    <a:bodyPr/>
+                    <a:lstStyle/>
+                    <a:p>
+                      <a:pPr algn="ctr"/>
+                      <a:r>
+                        <a:rPr lang="en-US" altLang="en-US" sz="3000" dirty="0"/>
+                        <a:t>go watch match</a:t>
+                      </a:r>
+                      <a:endParaRPr lang="en-PH" sz="3000" dirty="0"/>
+                    </a:p>
+                  </a:txBody>
+                  <a:tcPr anchor="ctr"/>
+                </a:tc>
+                <a:extLst>
+                  <a:ext uri="{0D108BD9-81ED-4DB2-BD59-A6C34878D82A}">
+                    <a16:rowId xmlns:a16="http://schemas.microsoft.com/office/drawing/2014/main" val="3614435626"/>
+                  </a:ext>
+                </a:extLst>
+              </a:tr>
+            </a:tbl>
+          </a:graphicData>
+        </a:graphic>
+      </p:graphicFrame>
+      <p:sp>
+        <p:nvSpPr>
+          <p:cNvPr id="2" name="TextBox 1">
+            <a:extLst>
+              <a:ext uri="{FF2B5EF4-FFF2-40B4-BE49-F238E27FC236}">
+                <a16:creationId xmlns:a16="http://schemas.microsoft.com/office/drawing/2014/main" id="{900F0F4D-EFB1-2224-9A2B-4474B7678423}"/>
+              </a:ext>
+            </a:extLst>
+          </p:cNvPr>
+          <p:cNvSpPr txBox="1"/>
+          <p:nvPr/>
+        </p:nvSpPr>
+        <p:spPr>
+          <a:xfrm>
+            <a:off x="459203" y="1440151"/>
+            <a:ext cx="11273589" cy="477054"/>
+          </a:xfrm>
+          <a:prstGeom prst="rect">
+            <a:avLst/>
+          </a:prstGeom>
+          <a:noFill/>
+        </p:spPr>
+        <p:txBody>
+          <a:bodyPr wrap="square">
+            <a:spAutoFit/>
+          </a:bodyPr>
+          <a:lstStyle/>
+          <a:p>
+            <a:pPr algn="l"/>
+            <a:r>
+              <a:rPr lang="en-US" sz="2500" dirty="0"/>
+              <a:t>A</a:t>
+            </a:r>
+            <a:r>
+              <a:rPr lang="en-PH" sz="2500" dirty="0" err="1"/>
+              <a:t>pply</a:t>
+            </a:r>
+            <a:r>
+              <a:rPr lang="en-PH" sz="2500" dirty="0"/>
+              <a:t> </a:t>
+            </a:r>
+            <a:r>
+              <a:rPr lang="en-PH" sz="2500" b="1" dirty="0"/>
+              <a:t>stop word removal </a:t>
+            </a:r>
+            <a:r>
+              <a:rPr lang="en-PH" sz="2500" dirty="0"/>
+              <a:t>and </a:t>
+            </a:r>
+            <a:r>
+              <a:rPr lang="en-PH" sz="2500" b="1" dirty="0"/>
+              <a:t>lemmatization</a:t>
+            </a:r>
+            <a:r>
+              <a:rPr lang="en-PH" sz="2500" dirty="0"/>
+              <a:t> before doing TF-IDF Vectorizer</a:t>
+            </a:r>
+          </a:p>
+        </p:txBody>
+      </p:sp>
+    </p:spTree>
+    <p:extLst>
+      <p:ext uri="{BB962C8B-B14F-4D97-AF65-F5344CB8AC3E}">
+        <p14:creationId xmlns:p14="http://schemas.microsoft.com/office/powerpoint/2010/main" val="1048641083"/>
+      </p:ext>
+    </p:extLst>
+  </p:cSld>
+  <p:clrMapOvr>
+    <a:masterClrMapping/>
+  </p:clrMapOvr>
+</p:sld>
+</file>
+
+<file path=ppt/slides/slide21.xml><?xml version="1.0" encoding="utf-8"?>
+<p:sld xmlns:a="http://schemas.openxmlformats.org/drawingml/2006/main" xmlns:r="http://schemas.openxmlformats.org/officeDocument/2006/relationships" xmlns:p="http://schemas.openxmlformats.org/presentationml/2006/main">
+  <p:cSld>
+    <p:bg>
+      <p:bgPr>
+        <a:blipFill dpi="0" rotWithShape="1">
+          <a:blip r:embed="rId3">
+            <a:alphaModFix amt="99000"/>
+            <a:lum/>
+          </a:blip>
+          <a:srcRect/>
+          <a:stretch>
+            <a:fillRect t="89000" r="85000" b="-1000"/>
+          </a:stretch>
+        </a:blipFill>
+        <a:effectLst/>
+      </p:bgPr>
+    </p:bg>
+    <p:spTree>
+      <p:nvGrpSpPr>
+        <p:cNvPr id="1" name=""/>
+        <p:cNvGrpSpPr/>
+        <p:nvPr/>
+      </p:nvGrpSpPr>
+      <p:grpSpPr>
+        <a:xfrm>
+          <a:off x="0" y="0"/>
+          <a:ext cx="0" cy="0"/>
+          <a:chOff x="0" y="0"/>
+          <a:chExt cx="0" cy="0"/>
+        </a:xfrm>
+      </p:grpSpPr>
+      <p:sp>
+        <p:nvSpPr>
+          <p:cNvPr id="4" name="Footer Placeholder 3">
+            <a:extLst>
+              <a:ext uri="{FF2B5EF4-FFF2-40B4-BE49-F238E27FC236}">
+                <a16:creationId xmlns:a16="http://schemas.microsoft.com/office/drawing/2014/main" id="{638E7DE1-45EE-476A-A474-0F3C264AEDA3}"/>
+              </a:ext>
+            </a:extLst>
+          </p:cNvPr>
+          <p:cNvSpPr>
+            <a:spLocks noGrp="1"/>
+          </p:cNvSpPr>
+          <p:nvPr>
+            <p:ph type="ftr" sz="quarter" idx="11"/>
+          </p:nvPr>
+        </p:nvSpPr>
+        <p:spPr>
+          <a:xfrm>
+            <a:off x="0" y="6139541"/>
+            <a:ext cx="12192000" cy="718459"/>
+          </a:xfrm>
+          <a:ln w="28575">
+            <a:solidFill>
+              <a:schemeClr val="accent5">
+                <a:lumMod val="50000"/>
+              </a:schemeClr>
+            </a:solidFill>
+          </a:ln>
+        </p:spPr>
+        <p:txBody>
+          <a:bodyPr/>
+          <a:lstStyle/>
+          <a:p>
+            <a:pPr algn="r"/>
+            <a:r>
+              <a:rPr lang="en-US" b="1">
+                <a:solidFill>
+                  <a:schemeClr val="tx1"/>
+                </a:solidFill>
+              </a:rPr>
+              <a:t>CCMACLRL</a:t>
+            </a:r>
+            <a:endParaRPr lang="en-PH" dirty="0"/>
+          </a:p>
+        </p:txBody>
+      </p:sp>
+      <p:sp>
+        <p:nvSpPr>
+          <p:cNvPr id="38" name="Title 1">
+            <a:extLst>
+              <a:ext uri="{FF2B5EF4-FFF2-40B4-BE49-F238E27FC236}">
+                <a16:creationId xmlns:a16="http://schemas.microsoft.com/office/drawing/2014/main" id="{34FAC5F5-ACD5-D061-4054-838F1C03E334}"/>
+              </a:ext>
+            </a:extLst>
+          </p:cNvPr>
+          <p:cNvSpPr>
+            <a:spLocks noGrp="1"/>
+          </p:cNvSpPr>
+          <p:nvPr>
+            <p:ph type="ctrTitle"/>
+          </p:nvPr>
+        </p:nvSpPr>
+        <p:spPr>
+          <a:xfrm>
+            <a:off x="459204" y="378458"/>
+            <a:ext cx="11273589" cy="718459"/>
+          </a:xfrm>
+        </p:spPr>
+        <p:txBody>
+          <a:bodyPr>
+            <a:noAutofit/>
+          </a:bodyPr>
+          <a:lstStyle/>
+          <a:p>
+            <a:r>
+              <a:rPr lang="en-GB" sz="5000" b="1" dirty="0"/>
+              <a:t>TF-IDF Vectorizer</a:t>
+            </a:r>
+            <a:endParaRPr lang="en-PH" sz="5000" b="1" dirty="0"/>
+          </a:p>
+        </p:txBody>
+      </p:sp>
+      <p:graphicFrame>
+        <p:nvGraphicFramePr>
           <p:cNvPr id="6" name="Table 5">
             <a:extLst>
               <a:ext uri="{FF2B5EF4-FFF2-40B4-BE49-F238E27FC236}">
@@ -10627,7 +11467,7 @@
 </p:sld>
 </file>
 
-<file path=ppt/slides/slide21.xml><?xml version="1.0" encoding="utf-8"?>
+<file path=ppt/slides/slide22.xml><?xml version="1.0" encoding="utf-8"?>
 <p:sld xmlns:a="http://schemas.openxmlformats.org/drawingml/2006/main" xmlns:r="http://schemas.openxmlformats.org/officeDocument/2006/relationships" xmlns:p="http://schemas.openxmlformats.org/presentationml/2006/main">
   <p:cSld>
     <p:bg>
@@ -10741,8 +11581,8 @@
           </a:p>
         </p:txBody>
       </p:sp>
-      <mc:AlternateContent xmlns:mc="http://schemas.openxmlformats.org/markup-compatibility/2006">
-        <mc:Choice xmlns:a14="http://schemas.microsoft.com/office/drawing/2010/main" Requires="a14">
+      <mc:AlternateContent xmlns:mc="http://schemas.openxmlformats.org/markup-compatibility/2006" xmlns:a14="http://schemas.microsoft.com/office/drawing/2010/main">
+        <mc:Choice Requires="a14">
           <p:sp>
             <p:nvSpPr>
               <p:cNvPr id="2" name="TextBox 1">
@@ -10980,7 +11820,7 @@
             </p:txBody>
           </p:sp>
         </mc:Choice>
-        <mc:Fallback>
+        <mc:Fallback xmlns="">
           <p:sp>
             <p:nvSpPr>
               <p:cNvPr id="2" name="TextBox 1">
@@ -11043,7 +11883,7 @@
 </p:sld>
 </file>
 
-<file path=ppt/slides/slide22.xml><?xml version="1.0" encoding="utf-8"?>
+<file path=ppt/slides/slide23.xml><?xml version="1.0" encoding="utf-8"?>
 <p:sld xmlns:a="http://schemas.openxmlformats.org/drawingml/2006/main" xmlns:r="http://schemas.openxmlformats.org/officeDocument/2006/relationships" xmlns:p="http://schemas.openxmlformats.org/presentationml/2006/main">
   <p:cSld>
     <p:bg>
@@ -11157,8 +11997,8 @@
           </a:p>
         </p:txBody>
       </p:sp>
-      <mc:AlternateContent xmlns:mc="http://schemas.openxmlformats.org/markup-compatibility/2006">
-        <mc:Choice xmlns:a14="http://schemas.microsoft.com/office/drawing/2010/main" Requires="a14">
+      <mc:AlternateContent xmlns:mc="http://schemas.openxmlformats.org/markup-compatibility/2006" xmlns:a14="http://schemas.microsoft.com/office/drawing/2010/main">
+        <mc:Choice Requires="a14">
           <p:sp>
             <p:nvSpPr>
               <p:cNvPr id="2" name="TextBox 1">
@@ -11250,7 +12090,7 @@
             </p:txBody>
           </p:sp>
         </mc:Choice>
-        <mc:Fallback>
+        <mc:Fallback xmlns="">
           <p:sp>
             <p:nvSpPr>
               <p:cNvPr id="2" name="TextBox 1">
@@ -11939,7 +12779,7 @@
 </p:sld>
 </file>
 
-<file path=ppt/slides/slide23.xml><?xml version="1.0" encoding="utf-8"?>
+<file path=ppt/slides/slide24.xml><?xml version="1.0" encoding="utf-8"?>
 <p:sld xmlns:a="http://schemas.openxmlformats.org/drawingml/2006/main" xmlns:r="http://schemas.openxmlformats.org/officeDocument/2006/relationships" xmlns:p="http://schemas.openxmlformats.org/presentationml/2006/main">
   <p:cSld>
     <p:bg>
@@ -12780,7 +13620,7 @@
 </p:sld>
 </file>
 
-<file path=ppt/slides/slide24.xml><?xml version="1.0" encoding="utf-8"?>
+<file path=ppt/slides/slide25.xml><?xml version="1.0" encoding="utf-8"?>
 <p:sld xmlns:a="http://schemas.openxmlformats.org/drawingml/2006/main" xmlns:r="http://schemas.openxmlformats.org/officeDocument/2006/relationships" xmlns:p="http://schemas.openxmlformats.org/presentationml/2006/main">
   <p:cSld>
     <p:bg>
@@ -12894,8 +13734,8 @@
           </a:p>
         </p:txBody>
       </p:sp>
-      <mc:AlternateContent xmlns:mc="http://schemas.openxmlformats.org/markup-compatibility/2006">
-        <mc:Choice xmlns:a14="http://schemas.microsoft.com/office/drawing/2010/main" Requires="a14">
+      <mc:AlternateContent xmlns:mc="http://schemas.openxmlformats.org/markup-compatibility/2006" xmlns:a14="http://schemas.microsoft.com/office/drawing/2010/main">
+        <mc:Choice Requires="a14">
           <p:sp>
             <p:nvSpPr>
               <p:cNvPr id="2" name="TextBox 1">
@@ -12934,7 +13774,6 @@
                 </a:endParaRPr>
               </a:p>
               <a:p>
-                <a:pPr/>
                 <a14:m>
                   <m:oMath xmlns:m="http://schemas.openxmlformats.org/officeDocument/2006/math">
                     <m:r>
@@ -13159,7 +13998,7 @@
             </p:txBody>
           </p:sp>
         </mc:Choice>
-        <mc:Fallback>
+        <mc:Fallback xmlns="">
           <p:sp>
             <p:nvSpPr>
               <p:cNvPr id="2" name="TextBox 1">
@@ -13222,7 +14061,7 @@
 </p:sld>
 </file>
 
-<file path=ppt/slides/slide25.xml><?xml version="1.0" encoding="utf-8"?>
+<file path=ppt/slides/slide26.xml><?xml version="1.0" encoding="utf-8"?>
 <p:sld xmlns:a="http://schemas.openxmlformats.org/drawingml/2006/main" xmlns:r="http://schemas.openxmlformats.org/officeDocument/2006/relationships" xmlns:p="http://schemas.openxmlformats.org/presentationml/2006/main">
   <p:cSld>
     <p:bg>
@@ -13336,8 +14175,8 @@
           </a:p>
         </p:txBody>
       </p:sp>
-      <mc:AlternateContent xmlns:mc="http://schemas.openxmlformats.org/markup-compatibility/2006">
-        <mc:Choice xmlns:a14="http://schemas.microsoft.com/office/drawing/2010/main" Requires="a14">
+      <mc:AlternateContent xmlns:mc="http://schemas.openxmlformats.org/markup-compatibility/2006" xmlns:a14="http://schemas.microsoft.com/office/drawing/2010/main">
+        <mc:Choice Requires="a14">
           <p:sp>
             <p:nvSpPr>
               <p:cNvPr id="2" name="TextBox 1">
@@ -13463,7 +14302,7 @@
             </p:txBody>
           </p:sp>
         </mc:Choice>
-        <mc:Fallback>
+        <mc:Fallback xmlns="">
           <p:sp>
             <p:nvSpPr>
               <p:cNvPr id="2" name="TextBox 1">
@@ -14152,7 +14991,7 @@
 </p:sld>
 </file>
 
-<file path=ppt/slides/slide26.xml><?xml version="1.0" encoding="utf-8"?>
+<file path=ppt/slides/slide27.xml><?xml version="1.0" encoding="utf-8"?>
 <p:sld xmlns:a="http://schemas.openxmlformats.org/drawingml/2006/main" xmlns:r="http://schemas.openxmlformats.org/officeDocument/2006/relationships" xmlns:p="http://schemas.openxmlformats.org/presentationml/2006/main">
   <p:cSld>
     <p:bg>
@@ -14266,8 +15105,8 @@
           </a:p>
         </p:txBody>
       </p:sp>
-      <mc:AlternateContent xmlns:mc="http://schemas.openxmlformats.org/markup-compatibility/2006">
-        <mc:Choice xmlns:a14="http://schemas.microsoft.com/office/drawing/2010/main" Requires="a14">
+      <mc:AlternateContent xmlns:mc="http://schemas.openxmlformats.org/markup-compatibility/2006" xmlns:a14="http://schemas.microsoft.com/office/drawing/2010/main">
+        <mc:Choice Requires="a14">
           <p:graphicFrame>
             <p:nvGraphicFramePr>
               <p:cNvPr id="3" name="Table 2">
@@ -14497,13 +15336,7 @@
                                     <a:rPr lang="en-US" sz="2500" b="0" i="1" smtClean="0">
                                       <a:latin typeface="Cambria Math" panose="02040503050406030204" pitchFamily="18" charset="0"/>
                                     </a:rPr>
-                                    <m:t>3/</m:t>
-                                  </m:r>
-                                  <m:r>
-                                    <a:rPr lang="en-US" sz="2500" b="0" i="1" smtClean="0">
-                                      <a:latin typeface="Cambria Math" panose="02040503050406030204" pitchFamily="18" charset="0"/>
-                                    </a:rPr>
-                                    <m:t>1</m:t>
+                                    <m:t>3/1</m:t>
                                   </m:r>
                                 </m:e>
                               </m:func>
@@ -14582,13 +15415,7 @@
                                     <a:rPr lang="en-US" sz="2500" b="0" i="1" smtClean="0">
                                       <a:latin typeface="Cambria Math" panose="02040503050406030204" pitchFamily="18" charset="0"/>
                                     </a:rPr>
-                                    <m:t>3/</m:t>
-                                  </m:r>
-                                  <m:r>
-                                    <a:rPr lang="en-US" sz="2500" b="0" i="1" smtClean="0">
-                                      <a:latin typeface="Cambria Math" panose="02040503050406030204" pitchFamily="18" charset="0"/>
-                                    </a:rPr>
-                                    <m:t>2</m:t>
+                                    <m:t>3/2</m:t>
                                   </m:r>
                                 </m:e>
                               </m:func>
@@ -14667,13 +15494,7 @@
                                     <a:rPr lang="en-US" sz="2500" b="0" i="1" smtClean="0">
                                       <a:latin typeface="Cambria Math" panose="02040503050406030204" pitchFamily="18" charset="0"/>
                                     </a:rPr>
-                                    <m:t>3/</m:t>
-                                  </m:r>
-                                  <m:r>
-                                    <a:rPr lang="en-US" sz="2500" b="0" i="1" smtClean="0">
-                                      <a:latin typeface="Cambria Math" panose="02040503050406030204" pitchFamily="18" charset="0"/>
-                                    </a:rPr>
-                                    <m:t>1</m:t>
+                                    <m:t>3/1</m:t>
                                   </m:r>
                                 </m:e>
                               </m:func>
@@ -14959,7 +15780,7 @@
             </a:graphic>
           </p:graphicFrame>
         </mc:Choice>
-        <mc:Fallback>
+        <mc:Fallback xmlns="">
           <p:graphicFrame>
             <p:nvGraphicFramePr>
               <p:cNvPr id="3" name="Table 2">
@@ -15342,7 +16163,7 @@
 </p:sld>
 </file>
 
-<file path=ppt/slides/slide27.xml><?xml version="1.0" encoding="utf-8"?>
+<file path=ppt/slides/slide28.xml><?xml version="1.0" encoding="utf-8"?>
 <p:sld xmlns:a="http://schemas.openxmlformats.org/drawingml/2006/main" xmlns:r="http://schemas.openxmlformats.org/officeDocument/2006/relationships" xmlns:p="http://schemas.openxmlformats.org/presentationml/2006/main">
   <p:cSld>
     <p:bg>
@@ -15473,7 +16294,7 @@
             <p:spPr>
               <a:xfrm>
                 <a:off x="2743060" y="3044279"/>
-                <a:ext cx="6705875" cy="769441"/>
+                <a:ext cx="5916556" cy="769441"/>
               </a:xfrm>
               <a:prstGeom prst="rect">
                 <a:avLst/>
@@ -15491,6 +16312,7 @@
               </a:bodyPr>
               <a:lstStyle/>
               <a:p>
+                <a:pPr/>
                 <a14:m>
                   <m:oMathPara xmlns:m="http://schemas.openxmlformats.org/officeDocument/2006/math">
                     <m:oMathParaPr>
@@ -15501,19 +16323,7 @@
                         <a:rPr lang="en-US" sz="5000" b="0" i="1" dirty="0" smtClean="0">
                           <a:latin typeface="Cambria Math" panose="02040503050406030204" pitchFamily="18" charset="0"/>
                         </a:rPr>
-                        <m:t>𝑇𝐹</m:t>
-                      </m:r>
-                      <m:r>
-                        <a:rPr lang="en-US" sz="5000" b="0" i="1" dirty="0" smtClean="0">
-                          <a:latin typeface="Cambria Math" panose="02040503050406030204" pitchFamily="18" charset="0"/>
-                        </a:rPr>
-                        <m:t>−</m:t>
-                      </m:r>
-                      <m:r>
-                        <a:rPr lang="en-US" sz="5000" b="0" i="1" dirty="0" smtClean="0">
-                          <a:latin typeface="Cambria Math" panose="02040503050406030204" pitchFamily="18" charset="0"/>
-                        </a:rPr>
-                        <m:t>𝐼𝐷𝐹</m:t>
+                        <m:t>𝑇𝐹𝐼𝐷𝐹</m:t>
                       </m:r>
                       <m:r>
                         <a:rPr lang="en-US" sz="5000" b="0" i="1" dirty="0" smtClean="0">
@@ -15565,7 +16375,7 @@
             <p:spPr>
               <a:xfrm>
                 <a:off x="2743060" y="3044279"/>
-                <a:ext cx="6705875" cy="769441"/>
+                <a:ext cx="5916556" cy="769441"/>
               </a:xfrm>
               <a:prstGeom prst="rect">
                 <a:avLst/>
@@ -15610,7 +16420,7 @@
 </p:sld>
 </file>
 
-<file path=ppt/slides/slide28.xml><?xml version="1.0" encoding="utf-8"?>
+<file path=ppt/slides/slide29.xml><?xml version="1.0" encoding="utf-8"?>
 <p:sld xmlns:a="http://schemas.openxmlformats.org/drawingml/2006/main" xmlns:r="http://schemas.openxmlformats.org/officeDocument/2006/relationships" xmlns:p="http://schemas.openxmlformats.org/presentationml/2006/main">
   <p:cSld>
     <p:bg>
@@ -16673,7 +17483,286 @@
 </p:sld>
 </file>
 
-<file path=ppt/slides/slide29.xml><?xml version="1.0" encoding="utf-8"?>
+<file path=ppt/slides/slide3.xml><?xml version="1.0" encoding="utf-8"?>
+<p:sld xmlns:a="http://schemas.openxmlformats.org/drawingml/2006/main" xmlns:r="http://schemas.openxmlformats.org/officeDocument/2006/relationships" xmlns:p="http://schemas.openxmlformats.org/presentationml/2006/main">
+  <p:cSld>
+    <p:bg>
+      <p:bgPr>
+        <a:blipFill dpi="0" rotWithShape="1">
+          <a:blip r:embed="rId3">
+            <a:alphaModFix amt="99000"/>
+            <a:lum/>
+          </a:blip>
+          <a:srcRect/>
+          <a:stretch>
+            <a:fillRect t="89000" r="85000" b="-1000"/>
+          </a:stretch>
+        </a:blipFill>
+        <a:effectLst/>
+      </p:bgPr>
+    </p:bg>
+    <p:spTree>
+      <p:nvGrpSpPr>
+        <p:cNvPr id="1" name=""/>
+        <p:cNvGrpSpPr/>
+        <p:nvPr/>
+      </p:nvGrpSpPr>
+      <p:grpSpPr>
+        <a:xfrm>
+          <a:off x="0" y="0"/>
+          <a:ext cx="0" cy="0"/>
+          <a:chOff x="0" y="0"/>
+          <a:chExt cx="0" cy="0"/>
+        </a:xfrm>
+      </p:grpSpPr>
+      <p:sp>
+        <p:nvSpPr>
+          <p:cNvPr id="4" name="Footer Placeholder 3">
+            <a:extLst>
+              <a:ext uri="{FF2B5EF4-FFF2-40B4-BE49-F238E27FC236}">
+                <a16:creationId xmlns:a16="http://schemas.microsoft.com/office/drawing/2014/main" id="{638E7DE1-45EE-476A-A474-0F3C264AEDA3}"/>
+              </a:ext>
+            </a:extLst>
+          </p:cNvPr>
+          <p:cNvSpPr>
+            <a:spLocks noGrp="1"/>
+          </p:cNvSpPr>
+          <p:nvPr>
+            <p:ph type="ftr" sz="quarter" idx="11"/>
+          </p:nvPr>
+        </p:nvSpPr>
+        <p:spPr>
+          <a:xfrm>
+            <a:off x="0" y="6139541"/>
+            <a:ext cx="12192000" cy="718459"/>
+          </a:xfrm>
+          <a:ln w="28575">
+            <a:solidFill>
+              <a:schemeClr val="accent5">
+                <a:lumMod val="50000"/>
+              </a:schemeClr>
+            </a:solidFill>
+          </a:ln>
+        </p:spPr>
+        <p:txBody>
+          <a:bodyPr/>
+          <a:lstStyle/>
+          <a:p>
+            <a:pPr algn="r"/>
+            <a:r>
+              <a:rPr lang="en-US" b="1">
+                <a:solidFill>
+                  <a:schemeClr val="tx1"/>
+                </a:solidFill>
+              </a:rPr>
+              <a:t>CCMACLRL</a:t>
+            </a:r>
+            <a:endParaRPr lang="en-PH" dirty="0"/>
+          </a:p>
+        </p:txBody>
+      </p:sp>
+      <p:sp>
+        <p:nvSpPr>
+          <p:cNvPr id="38" name="Title 1">
+            <a:extLst>
+              <a:ext uri="{FF2B5EF4-FFF2-40B4-BE49-F238E27FC236}">
+                <a16:creationId xmlns:a16="http://schemas.microsoft.com/office/drawing/2014/main" id="{34FAC5F5-ACD5-D061-4054-838F1C03E334}"/>
+              </a:ext>
+            </a:extLst>
+          </p:cNvPr>
+          <p:cNvSpPr>
+            <a:spLocks noGrp="1"/>
+          </p:cNvSpPr>
+          <p:nvPr>
+            <p:ph type="ctrTitle"/>
+          </p:nvPr>
+        </p:nvSpPr>
+        <p:spPr>
+          <a:xfrm>
+            <a:off x="459204" y="378458"/>
+            <a:ext cx="11273589" cy="718459"/>
+          </a:xfrm>
+        </p:spPr>
+        <p:txBody>
+          <a:bodyPr>
+            <a:noAutofit/>
+          </a:bodyPr>
+          <a:lstStyle/>
+          <a:p>
+            <a:r>
+              <a:rPr lang="en-GB" sz="5000" b="1" dirty="0"/>
+              <a:t>Steps in Text pre-processing</a:t>
+            </a:r>
+            <a:endParaRPr lang="en-PH" sz="5000" b="1" dirty="0"/>
+          </a:p>
+        </p:txBody>
+      </p:sp>
+      <p:sp>
+        <p:nvSpPr>
+          <p:cNvPr id="3" name="TextBox 2">
+            <a:extLst>
+              <a:ext uri="{FF2B5EF4-FFF2-40B4-BE49-F238E27FC236}">
+                <a16:creationId xmlns:a16="http://schemas.microsoft.com/office/drawing/2014/main" id="{2F457E6A-8A4F-6FA8-BC00-1B4BACAA4188}"/>
+              </a:ext>
+            </a:extLst>
+          </p:cNvPr>
+          <p:cNvSpPr txBox="1"/>
+          <p:nvPr/>
+        </p:nvSpPr>
+        <p:spPr>
+          <a:xfrm>
+            <a:off x="459205" y="1096917"/>
+            <a:ext cx="11273588" cy="4868256"/>
+          </a:xfrm>
+          <a:prstGeom prst="rect">
+            <a:avLst/>
+          </a:prstGeom>
+          <a:noFill/>
+        </p:spPr>
+        <p:txBody>
+          <a:bodyPr wrap="square">
+            <a:spAutoFit/>
+          </a:bodyPr>
+          <a:lstStyle/>
+          <a:p>
+            <a:pPr algn="l">
+              <a:lnSpc>
+                <a:spcPct val="150000"/>
+              </a:lnSpc>
+              <a:buFont typeface="+mj-lt"/>
+              <a:buAutoNum type="arabicPeriod"/>
+            </a:pPr>
+            <a:r>
+              <a:rPr lang="en-PH" sz="3000" dirty="0"/>
+              <a:t> </a:t>
+            </a:r>
+            <a:r>
+              <a:rPr lang="en-PH" sz="3000" b="1" dirty="0"/>
+              <a:t>Lower Casing</a:t>
+            </a:r>
+          </a:p>
+          <a:p>
+            <a:pPr algn="l">
+              <a:lnSpc>
+                <a:spcPct val="150000"/>
+              </a:lnSpc>
+              <a:buFont typeface="+mj-lt"/>
+              <a:buAutoNum type="arabicPeriod"/>
+            </a:pPr>
+            <a:r>
+              <a:rPr lang="en-PH" sz="3000" dirty="0"/>
+              <a:t> </a:t>
+            </a:r>
+            <a:r>
+              <a:rPr lang="en-PH" sz="3000" b="1" dirty="0"/>
+              <a:t>Tokenization</a:t>
+            </a:r>
+          </a:p>
+          <a:p>
+            <a:pPr algn="l">
+              <a:lnSpc>
+                <a:spcPct val="150000"/>
+              </a:lnSpc>
+              <a:buFont typeface="+mj-lt"/>
+              <a:buAutoNum type="arabicPeriod"/>
+            </a:pPr>
+            <a:r>
+              <a:rPr lang="en-PH" sz="3000" dirty="0"/>
+              <a:t> </a:t>
+            </a:r>
+            <a:r>
+              <a:rPr lang="en-PH" sz="3000" b="1" dirty="0"/>
+              <a:t>Removing</a:t>
+            </a:r>
+            <a:r>
+              <a:rPr lang="en-PH" sz="3000" dirty="0"/>
+              <a:t> </a:t>
+            </a:r>
+            <a:r>
+              <a:rPr lang="en-PH" sz="3000" b="1" dirty="0"/>
+              <a:t>punctuation marks, special characters, URLs and digits</a:t>
+            </a:r>
+          </a:p>
+          <a:p>
+            <a:pPr algn="l">
+              <a:lnSpc>
+                <a:spcPct val="150000"/>
+              </a:lnSpc>
+              <a:buFont typeface="+mj-lt"/>
+              <a:buAutoNum type="arabicPeriod"/>
+            </a:pPr>
+            <a:r>
+              <a:rPr lang="en-PH" sz="3000" dirty="0"/>
+              <a:t> </a:t>
+            </a:r>
+            <a:r>
+              <a:rPr lang="en-PH" sz="3000" b="1" dirty="0"/>
+              <a:t>Stop Word Removal</a:t>
+            </a:r>
+          </a:p>
+          <a:p>
+            <a:pPr algn="l">
+              <a:lnSpc>
+                <a:spcPct val="150000"/>
+              </a:lnSpc>
+              <a:buFont typeface="+mj-lt"/>
+              <a:buAutoNum type="arabicPeriod"/>
+            </a:pPr>
+            <a:r>
+              <a:rPr lang="en-PH" sz="3000" dirty="0"/>
+              <a:t> </a:t>
+            </a:r>
+            <a:r>
+              <a:rPr lang="en-PH" sz="3000" b="1" dirty="0"/>
+              <a:t>Stemming</a:t>
+            </a:r>
+          </a:p>
+          <a:p>
+            <a:pPr algn="l">
+              <a:lnSpc>
+                <a:spcPct val="150000"/>
+              </a:lnSpc>
+              <a:buFont typeface="+mj-lt"/>
+              <a:buAutoNum type="arabicPeriod"/>
+            </a:pPr>
+            <a:r>
+              <a:rPr lang="en-PH" sz="3000" dirty="0"/>
+              <a:t> </a:t>
+            </a:r>
+            <a:r>
+              <a:rPr lang="en-PH" sz="3000" b="1" dirty="0"/>
+              <a:t>Lemmatization</a:t>
+            </a:r>
+          </a:p>
+          <a:p>
+            <a:pPr algn="l">
+              <a:lnSpc>
+                <a:spcPct val="150000"/>
+              </a:lnSpc>
+              <a:buFont typeface="+mj-lt"/>
+              <a:buAutoNum type="arabicPeriod"/>
+            </a:pPr>
+            <a:r>
+              <a:rPr lang="en-PH" sz="3000" b="1" dirty="0"/>
+              <a:t> Count Vectorizer and TF-IDF</a:t>
+            </a:r>
+          </a:p>
+        </p:txBody>
+      </p:sp>
+    </p:spTree>
+    <p:extLst>
+      <p:ext uri="{BB962C8B-B14F-4D97-AF65-F5344CB8AC3E}">
+        <p14:creationId xmlns:p14="http://schemas.microsoft.com/office/powerpoint/2010/main" val="2805370189"/>
+      </p:ext>
+    </p:extLst>
+  </p:cSld>
+  <p:clrMapOvr>
+    <a:masterClrMapping/>
+  </p:clrMapOvr>
+</p:sld>
+</file>
+
+<file path=ppt/slides/slide30.xml><?xml version="1.0" encoding="utf-8"?>
 <p:sld xmlns:a="http://schemas.openxmlformats.org/drawingml/2006/main" xmlns:r="http://schemas.openxmlformats.org/officeDocument/2006/relationships" xmlns:p="http://schemas.openxmlformats.org/presentationml/2006/main">
   <p:cSld>
     <p:bg>
@@ -17748,285 +18837,6 @@
 </p:sld>
 </file>
 
-<file path=ppt/slides/slide3.xml><?xml version="1.0" encoding="utf-8"?>
-<p:sld xmlns:a="http://schemas.openxmlformats.org/drawingml/2006/main" xmlns:r="http://schemas.openxmlformats.org/officeDocument/2006/relationships" xmlns:p="http://schemas.openxmlformats.org/presentationml/2006/main">
-  <p:cSld>
-    <p:bg>
-      <p:bgPr>
-        <a:blipFill dpi="0" rotWithShape="1">
-          <a:blip r:embed="rId3">
-            <a:alphaModFix amt="99000"/>
-            <a:lum/>
-          </a:blip>
-          <a:srcRect/>
-          <a:stretch>
-            <a:fillRect t="89000" r="85000" b="-1000"/>
-          </a:stretch>
-        </a:blipFill>
-        <a:effectLst/>
-      </p:bgPr>
-    </p:bg>
-    <p:spTree>
-      <p:nvGrpSpPr>
-        <p:cNvPr id="1" name=""/>
-        <p:cNvGrpSpPr/>
-        <p:nvPr/>
-      </p:nvGrpSpPr>
-      <p:grpSpPr>
-        <a:xfrm>
-          <a:off x="0" y="0"/>
-          <a:ext cx="0" cy="0"/>
-          <a:chOff x="0" y="0"/>
-          <a:chExt cx="0" cy="0"/>
-        </a:xfrm>
-      </p:grpSpPr>
-      <p:sp>
-        <p:nvSpPr>
-          <p:cNvPr id="4" name="Footer Placeholder 3">
-            <a:extLst>
-              <a:ext uri="{FF2B5EF4-FFF2-40B4-BE49-F238E27FC236}">
-                <a16:creationId xmlns:a16="http://schemas.microsoft.com/office/drawing/2014/main" id="{638E7DE1-45EE-476A-A474-0F3C264AEDA3}"/>
-              </a:ext>
-            </a:extLst>
-          </p:cNvPr>
-          <p:cNvSpPr>
-            <a:spLocks noGrp="1"/>
-          </p:cNvSpPr>
-          <p:nvPr>
-            <p:ph type="ftr" sz="quarter" idx="11"/>
-          </p:nvPr>
-        </p:nvSpPr>
-        <p:spPr>
-          <a:xfrm>
-            <a:off x="0" y="6139541"/>
-            <a:ext cx="12192000" cy="718459"/>
-          </a:xfrm>
-          <a:ln w="28575">
-            <a:solidFill>
-              <a:schemeClr val="accent5">
-                <a:lumMod val="50000"/>
-              </a:schemeClr>
-            </a:solidFill>
-          </a:ln>
-        </p:spPr>
-        <p:txBody>
-          <a:bodyPr/>
-          <a:lstStyle/>
-          <a:p>
-            <a:pPr algn="r"/>
-            <a:r>
-              <a:rPr lang="en-US" b="1">
-                <a:solidFill>
-                  <a:schemeClr val="tx1"/>
-                </a:solidFill>
-              </a:rPr>
-              <a:t>CCMACLRL</a:t>
-            </a:r>
-            <a:endParaRPr lang="en-PH" dirty="0"/>
-          </a:p>
-        </p:txBody>
-      </p:sp>
-      <p:sp>
-        <p:nvSpPr>
-          <p:cNvPr id="38" name="Title 1">
-            <a:extLst>
-              <a:ext uri="{FF2B5EF4-FFF2-40B4-BE49-F238E27FC236}">
-                <a16:creationId xmlns:a16="http://schemas.microsoft.com/office/drawing/2014/main" id="{34FAC5F5-ACD5-D061-4054-838F1C03E334}"/>
-              </a:ext>
-            </a:extLst>
-          </p:cNvPr>
-          <p:cNvSpPr>
-            <a:spLocks noGrp="1"/>
-          </p:cNvSpPr>
-          <p:nvPr>
-            <p:ph type="ctrTitle"/>
-          </p:nvPr>
-        </p:nvSpPr>
-        <p:spPr>
-          <a:xfrm>
-            <a:off x="459204" y="378458"/>
-            <a:ext cx="11273589" cy="718459"/>
-          </a:xfrm>
-        </p:spPr>
-        <p:txBody>
-          <a:bodyPr>
-            <a:noAutofit/>
-          </a:bodyPr>
-          <a:lstStyle/>
-          <a:p>
-            <a:r>
-              <a:rPr lang="en-GB" sz="5000" b="1" dirty="0"/>
-              <a:t>Steps in Text pre-processing</a:t>
-            </a:r>
-            <a:endParaRPr lang="en-PH" sz="5000" b="1" dirty="0"/>
-          </a:p>
-        </p:txBody>
-      </p:sp>
-      <p:sp>
-        <p:nvSpPr>
-          <p:cNvPr id="3" name="TextBox 2">
-            <a:extLst>
-              <a:ext uri="{FF2B5EF4-FFF2-40B4-BE49-F238E27FC236}">
-                <a16:creationId xmlns:a16="http://schemas.microsoft.com/office/drawing/2014/main" id="{2F457E6A-8A4F-6FA8-BC00-1B4BACAA4188}"/>
-              </a:ext>
-            </a:extLst>
-          </p:cNvPr>
-          <p:cNvSpPr txBox="1"/>
-          <p:nvPr/>
-        </p:nvSpPr>
-        <p:spPr>
-          <a:xfrm>
-            <a:off x="459205" y="1096917"/>
-            <a:ext cx="11273588" cy="4868256"/>
-          </a:xfrm>
-          <a:prstGeom prst="rect">
-            <a:avLst/>
-          </a:prstGeom>
-          <a:noFill/>
-        </p:spPr>
-        <p:txBody>
-          <a:bodyPr wrap="square">
-            <a:spAutoFit/>
-          </a:bodyPr>
-          <a:lstStyle/>
-          <a:p>
-            <a:pPr algn="l">
-              <a:lnSpc>
-                <a:spcPct val="150000"/>
-              </a:lnSpc>
-              <a:buFont typeface="+mj-lt"/>
-              <a:buAutoNum type="arabicPeriod"/>
-            </a:pPr>
-            <a:r>
-              <a:rPr lang="en-PH" sz="3000" dirty="0"/>
-              <a:t> </a:t>
-            </a:r>
-            <a:r>
-              <a:rPr lang="en-PH" sz="3000" b="1" dirty="0"/>
-              <a:t>Lower Casing</a:t>
-            </a:r>
-          </a:p>
-          <a:p>
-            <a:pPr algn="l">
-              <a:lnSpc>
-                <a:spcPct val="150000"/>
-              </a:lnSpc>
-              <a:buFont typeface="+mj-lt"/>
-              <a:buAutoNum type="arabicPeriod"/>
-            </a:pPr>
-            <a:r>
-              <a:rPr lang="en-PH" sz="3000" dirty="0"/>
-              <a:t> </a:t>
-            </a:r>
-            <a:r>
-              <a:rPr lang="en-PH" sz="3000" b="1" dirty="0"/>
-              <a:t>Tokenization</a:t>
-            </a:r>
-          </a:p>
-          <a:p>
-            <a:pPr algn="l">
-              <a:lnSpc>
-                <a:spcPct val="150000"/>
-              </a:lnSpc>
-              <a:buFont typeface="+mj-lt"/>
-              <a:buAutoNum type="arabicPeriod"/>
-            </a:pPr>
-            <a:r>
-              <a:rPr lang="en-PH" sz="3000" dirty="0"/>
-              <a:t> </a:t>
-            </a:r>
-            <a:r>
-              <a:rPr lang="en-PH" sz="3000" b="1" dirty="0"/>
-              <a:t>Removing</a:t>
-            </a:r>
-            <a:r>
-              <a:rPr lang="en-PH" sz="3000" dirty="0"/>
-              <a:t> </a:t>
-            </a:r>
-            <a:r>
-              <a:rPr lang="en-PH" sz="3000" b="1" dirty="0"/>
-              <a:t>punctuation marks, special characters, URLs and digits</a:t>
-            </a:r>
-          </a:p>
-          <a:p>
-            <a:pPr algn="l">
-              <a:lnSpc>
-                <a:spcPct val="150000"/>
-              </a:lnSpc>
-              <a:buFont typeface="+mj-lt"/>
-              <a:buAutoNum type="arabicPeriod"/>
-            </a:pPr>
-            <a:r>
-              <a:rPr lang="en-PH" sz="3000" dirty="0"/>
-              <a:t> </a:t>
-            </a:r>
-            <a:r>
-              <a:rPr lang="en-PH" sz="3000" b="1" dirty="0"/>
-              <a:t>Stop Word Removal</a:t>
-            </a:r>
-          </a:p>
-          <a:p>
-            <a:pPr algn="l">
-              <a:lnSpc>
-                <a:spcPct val="150000"/>
-              </a:lnSpc>
-              <a:buFont typeface="+mj-lt"/>
-              <a:buAutoNum type="arabicPeriod"/>
-            </a:pPr>
-            <a:r>
-              <a:rPr lang="en-PH" sz="3000" dirty="0"/>
-              <a:t> </a:t>
-            </a:r>
-            <a:r>
-              <a:rPr lang="en-PH" sz="3000" b="1" dirty="0"/>
-              <a:t>Stemming</a:t>
-            </a:r>
-          </a:p>
-          <a:p>
-            <a:pPr algn="l">
-              <a:lnSpc>
-                <a:spcPct val="150000"/>
-              </a:lnSpc>
-              <a:buFont typeface="+mj-lt"/>
-              <a:buAutoNum type="arabicPeriod"/>
-            </a:pPr>
-            <a:r>
-              <a:rPr lang="en-PH" sz="3000" dirty="0"/>
-              <a:t> </a:t>
-            </a:r>
-            <a:r>
-              <a:rPr lang="en-PH" sz="3000" b="1" dirty="0"/>
-              <a:t>Lemmatization</a:t>
-            </a:r>
-          </a:p>
-          <a:p>
-            <a:pPr algn="l">
-              <a:lnSpc>
-                <a:spcPct val="150000"/>
-              </a:lnSpc>
-              <a:buFont typeface="+mj-lt"/>
-              <a:buAutoNum type="arabicPeriod"/>
-            </a:pPr>
-            <a:r>
-              <a:rPr lang="en-PH" sz="3000" b="1" dirty="0"/>
-              <a:t> Count Vectorizer and TF-IDF</a:t>
-            </a:r>
-          </a:p>
-        </p:txBody>
-      </p:sp>
-    </p:spTree>
-    <p:extLst>
-      <p:ext uri="{BB962C8B-B14F-4D97-AF65-F5344CB8AC3E}">
-        <p14:creationId xmlns:p14="http://schemas.microsoft.com/office/powerpoint/2010/main" val="2805370189"/>
-      </p:ext>
-    </p:extLst>
-  </p:cSld>
-  <p:clrMapOvr>
-    <a:masterClrMapping/>
-  </p:clrMapOvr>
-</p:sld>
-</file>
-
 <file path=ppt/slides/slide4.xml><?xml version="1.0" encoding="utf-8"?>
 <p:sld xmlns:a="http://schemas.openxmlformats.org/drawingml/2006/main" xmlns:r="http://schemas.openxmlformats.org/officeDocument/2006/relationships" xmlns:p="http://schemas.openxmlformats.org/presentationml/2006/main">
   <p:cSld>
@@ -18765,6 +19575,433 @@
 </file>
 
 <file path=ppt/slides/slide6.xml><?xml version="1.0" encoding="utf-8"?>
+<p:sld xmlns:a="http://schemas.openxmlformats.org/drawingml/2006/main" xmlns:r="http://schemas.openxmlformats.org/officeDocument/2006/relationships" xmlns:p="http://schemas.openxmlformats.org/presentationml/2006/main">
+  <p:cSld>
+    <p:bg>
+      <p:bgPr>
+        <a:blipFill dpi="0" rotWithShape="1">
+          <a:blip r:embed="rId3">
+            <a:alphaModFix amt="99000"/>
+            <a:lum/>
+          </a:blip>
+          <a:srcRect/>
+          <a:stretch>
+            <a:fillRect t="89000" r="85000" b="-1000"/>
+          </a:stretch>
+        </a:blipFill>
+        <a:effectLst/>
+      </p:bgPr>
+    </p:bg>
+    <p:spTree>
+      <p:nvGrpSpPr>
+        <p:cNvPr id="1" name=""/>
+        <p:cNvGrpSpPr/>
+        <p:nvPr/>
+      </p:nvGrpSpPr>
+      <p:grpSpPr>
+        <a:xfrm>
+          <a:off x="0" y="0"/>
+          <a:ext cx="0" cy="0"/>
+          <a:chOff x="0" y="0"/>
+          <a:chExt cx="0" cy="0"/>
+        </a:xfrm>
+      </p:grpSpPr>
+      <p:sp>
+        <p:nvSpPr>
+          <p:cNvPr id="4" name="Footer Placeholder 3">
+            <a:extLst>
+              <a:ext uri="{FF2B5EF4-FFF2-40B4-BE49-F238E27FC236}">
+                <a16:creationId xmlns:a16="http://schemas.microsoft.com/office/drawing/2014/main" id="{638E7DE1-45EE-476A-A474-0F3C264AEDA3}"/>
+              </a:ext>
+            </a:extLst>
+          </p:cNvPr>
+          <p:cNvSpPr>
+            <a:spLocks noGrp="1"/>
+          </p:cNvSpPr>
+          <p:nvPr>
+            <p:ph type="ftr" sz="quarter" idx="11"/>
+          </p:nvPr>
+        </p:nvSpPr>
+        <p:spPr>
+          <a:xfrm>
+            <a:off x="0" y="6139541"/>
+            <a:ext cx="12192000" cy="718459"/>
+          </a:xfrm>
+          <a:ln w="28575">
+            <a:solidFill>
+              <a:schemeClr val="accent5">
+                <a:lumMod val="50000"/>
+              </a:schemeClr>
+            </a:solidFill>
+          </a:ln>
+        </p:spPr>
+        <p:txBody>
+          <a:bodyPr/>
+          <a:lstStyle/>
+          <a:p>
+            <a:pPr algn="r"/>
+            <a:r>
+              <a:rPr lang="en-US" b="1">
+                <a:solidFill>
+                  <a:schemeClr val="tx1"/>
+                </a:solidFill>
+              </a:rPr>
+              <a:t>CCMACLRL</a:t>
+            </a:r>
+            <a:endParaRPr lang="en-PH" dirty="0"/>
+          </a:p>
+        </p:txBody>
+      </p:sp>
+      <p:sp>
+        <p:nvSpPr>
+          <p:cNvPr id="38" name="Title 1">
+            <a:extLst>
+              <a:ext uri="{FF2B5EF4-FFF2-40B4-BE49-F238E27FC236}">
+                <a16:creationId xmlns:a16="http://schemas.microsoft.com/office/drawing/2014/main" id="{34FAC5F5-ACD5-D061-4054-838F1C03E334}"/>
+              </a:ext>
+            </a:extLst>
+          </p:cNvPr>
+          <p:cNvSpPr>
+            <a:spLocks noGrp="1"/>
+          </p:cNvSpPr>
+          <p:nvPr>
+            <p:ph type="ctrTitle"/>
+          </p:nvPr>
+        </p:nvSpPr>
+        <p:spPr>
+          <a:xfrm>
+            <a:off x="459204" y="378458"/>
+            <a:ext cx="11273589" cy="718459"/>
+          </a:xfrm>
+        </p:spPr>
+        <p:txBody>
+          <a:bodyPr>
+            <a:noAutofit/>
+          </a:bodyPr>
+          <a:lstStyle/>
+          <a:p>
+            <a:r>
+              <a:rPr lang="en-GB" sz="4500" b="1" dirty="0"/>
+              <a:t>Removing URL’s, Digits and Special Characters</a:t>
+            </a:r>
+            <a:endParaRPr lang="en-PH" sz="4500" b="1" dirty="0"/>
+          </a:p>
+        </p:txBody>
+      </p:sp>
+      <p:sp>
+        <p:nvSpPr>
+          <p:cNvPr id="3" name="TextBox 2">
+            <a:extLst>
+              <a:ext uri="{FF2B5EF4-FFF2-40B4-BE49-F238E27FC236}">
+                <a16:creationId xmlns:a16="http://schemas.microsoft.com/office/drawing/2014/main" id="{2F457E6A-8A4F-6FA8-BC00-1B4BACAA4188}"/>
+              </a:ext>
+            </a:extLst>
+          </p:cNvPr>
+          <p:cNvSpPr txBox="1"/>
+          <p:nvPr/>
+        </p:nvSpPr>
+        <p:spPr>
+          <a:xfrm>
+            <a:off x="475922" y="3687463"/>
+            <a:ext cx="11085601" cy="712696"/>
+          </a:xfrm>
+          <a:prstGeom prst="rect">
+            <a:avLst/>
+          </a:prstGeom>
+          <a:noFill/>
+        </p:spPr>
+        <p:txBody>
+          <a:bodyPr wrap="square">
+            <a:spAutoFit/>
+          </a:bodyPr>
+          <a:lstStyle/>
+          <a:p>
+            <a:pPr>
+              <a:lnSpc>
+                <a:spcPct val="150000"/>
+              </a:lnSpc>
+            </a:pPr>
+            <a:r>
+              <a:rPr lang="en-PH" sz="3000" dirty="0">
+                <a:latin typeface="Consolas" panose="020B0609020204030204" pitchFamily="49" charset="0"/>
+                <a:cs typeface="Consolas" panose="020B0609020204030204" pitchFamily="49" charset="0"/>
+              </a:rPr>
+              <a:t>[”Please visit www.youtube.com”] </a:t>
+            </a:r>
+            <a:r>
+              <a:rPr lang="en-PH" sz="3000" dirty="0">
+                <a:latin typeface="Google Sans"/>
+              </a:rPr>
+              <a:t>→</a:t>
+            </a:r>
+            <a:r>
+              <a:rPr lang="en-PH" sz="3000" dirty="0">
+                <a:latin typeface="Consolas" panose="020B0609020204030204" pitchFamily="49" charset="0"/>
+                <a:cs typeface="Consolas" panose="020B0609020204030204" pitchFamily="49" charset="0"/>
+              </a:rPr>
+              <a:t> [“Please visit”]</a:t>
+            </a:r>
+          </a:p>
+        </p:txBody>
+      </p:sp>
+      <p:sp>
+        <p:nvSpPr>
+          <p:cNvPr id="6" name="TextBox 5">
+            <a:extLst>
+              <a:ext uri="{FF2B5EF4-FFF2-40B4-BE49-F238E27FC236}">
+                <a16:creationId xmlns:a16="http://schemas.microsoft.com/office/drawing/2014/main" id="{5E5DC7C9-6A45-A3E2-F421-2A25E3B5F5E1}"/>
+              </a:ext>
+            </a:extLst>
+          </p:cNvPr>
+          <p:cNvSpPr txBox="1"/>
+          <p:nvPr/>
+        </p:nvSpPr>
+        <p:spPr>
+          <a:xfrm>
+            <a:off x="459203" y="1368125"/>
+            <a:ext cx="11273589" cy="1938992"/>
+          </a:xfrm>
+          <a:prstGeom prst="rect">
+            <a:avLst/>
+          </a:prstGeom>
+          <a:noFill/>
+        </p:spPr>
+        <p:txBody>
+          <a:bodyPr wrap="square">
+            <a:spAutoFit/>
+          </a:bodyPr>
+          <a:lstStyle/>
+          <a:p>
+            <a:pPr algn="l"/>
+            <a:r>
+              <a:rPr lang="en-PH" sz="3000" dirty="0"/>
+              <a:t>URLs or links to webpages, digits and special characters</a:t>
+            </a:r>
+          </a:p>
+          <a:p>
+            <a:pPr algn="l"/>
+            <a:endParaRPr lang="en-PH" sz="3000" dirty="0"/>
+          </a:p>
+          <a:p>
+            <a:pPr algn="l"/>
+            <a:r>
+              <a:rPr lang="en-US" sz="3000" dirty="0"/>
+              <a:t>These do not add any value to text data and therefore should be removed before processing.</a:t>
+            </a:r>
+            <a:endParaRPr lang="en-PH" sz="3000" dirty="0"/>
+          </a:p>
+        </p:txBody>
+      </p:sp>
+      <p:sp>
+        <p:nvSpPr>
+          <p:cNvPr id="2" name="TextBox 1">
+            <a:extLst>
+              <a:ext uri="{FF2B5EF4-FFF2-40B4-BE49-F238E27FC236}">
+                <a16:creationId xmlns:a16="http://schemas.microsoft.com/office/drawing/2014/main" id="{83F5874F-BB00-331E-4D8D-7A96D667F23B}"/>
+              </a:ext>
+            </a:extLst>
+          </p:cNvPr>
+          <p:cNvSpPr txBox="1"/>
+          <p:nvPr/>
+        </p:nvSpPr>
+        <p:spPr>
+          <a:xfrm>
+            <a:off x="459203" y="4424157"/>
+            <a:ext cx="11484364" cy="671338"/>
+          </a:xfrm>
+          <a:prstGeom prst="rect">
+            <a:avLst/>
+          </a:prstGeom>
+          <a:noFill/>
+        </p:spPr>
+        <p:txBody>
+          <a:bodyPr wrap="square">
+            <a:spAutoFit/>
+          </a:bodyPr>
+          <a:lstStyle/>
+          <a:p>
+            <a:pPr>
+              <a:lnSpc>
+                <a:spcPct val="150000"/>
+              </a:lnSpc>
+            </a:pPr>
+            <a:r>
+              <a:rPr lang="en-PH" sz="2800" dirty="0">
+                <a:latin typeface="Consolas" panose="020B0609020204030204" pitchFamily="49" charset="0"/>
+                <a:cs typeface="Consolas" panose="020B0609020204030204" pitchFamily="49" charset="0"/>
+              </a:rPr>
+              <a:t>[”I have $5.00 in my account”] </a:t>
+            </a:r>
+            <a:r>
+              <a:rPr lang="en-PH" sz="2800" dirty="0">
+                <a:latin typeface="Google Sans"/>
+              </a:rPr>
+              <a:t>→</a:t>
+            </a:r>
+            <a:r>
+              <a:rPr lang="en-PH" sz="2800" dirty="0">
+                <a:latin typeface="Consolas" panose="020B0609020204030204" pitchFamily="49" charset="0"/>
+                <a:cs typeface="Consolas" panose="020B0609020204030204" pitchFamily="49" charset="0"/>
+              </a:rPr>
+              <a:t> [“I have in my account”]</a:t>
+            </a:r>
+          </a:p>
+        </p:txBody>
+      </p:sp>
+    </p:spTree>
+    <p:extLst>
+      <p:ext uri="{BB962C8B-B14F-4D97-AF65-F5344CB8AC3E}">
+        <p14:creationId xmlns:p14="http://schemas.microsoft.com/office/powerpoint/2010/main" val="2143982013"/>
+      </p:ext>
+    </p:extLst>
+  </p:cSld>
+  <p:clrMapOvr>
+    <a:masterClrMapping/>
+  </p:clrMapOvr>
+  <p:timing>
+    <p:tnLst>
+      <p:par>
+        <p:cTn id="1" dur="indefinite" restart="never" nodeType="tmRoot">
+          <p:childTnLst>
+            <p:seq concurrent="1" nextAc="seek">
+              <p:cTn id="2" dur="indefinite" nodeType="mainSeq">
+                <p:childTnLst>
+                  <p:par>
+                    <p:cTn id="3" fill="hold">
+                      <p:stCondLst>
+                        <p:cond delay="indefinite"/>
+                      </p:stCondLst>
+                      <p:childTnLst>
+                        <p:par>
+                          <p:cTn id="4" fill="hold">
+                            <p:stCondLst>
+                              <p:cond delay="0"/>
+                            </p:stCondLst>
+                            <p:childTnLst>
+                              <p:par>
+                                <p:cTn id="5" presetID="9" presetClass="entr" presetSubtype="0" fill="hold" grpId="0" nodeType="clickEffect">
+                                  <p:stCondLst>
+                                    <p:cond delay="0"/>
+                                  </p:stCondLst>
+                                  <p:childTnLst>
+                                    <p:set>
+                                      <p:cBhvr>
+                                        <p:cTn id="6" dur="1" fill="hold">
+                                          <p:stCondLst>
+                                            <p:cond delay="0"/>
+                                          </p:stCondLst>
+                                        </p:cTn>
+                                        <p:tgtEl>
+                                          <p:spTgt spid="3"/>
+                                        </p:tgtEl>
+                                        <p:attrNameLst>
+                                          <p:attrName>style.visibility</p:attrName>
+                                        </p:attrNameLst>
+                                      </p:cBhvr>
+                                      <p:to>
+                                        <p:strVal val="visible"/>
+                                      </p:to>
+                                    </p:set>
+                                    <p:animEffect transition="in" filter="dissolve">
+                                      <p:cBhvr>
+                                        <p:cTn id="7" dur="500"/>
+                                        <p:tgtEl>
+                                          <p:spTgt spid="3"/>
+                                        </p:tgtEl>
+                                      </p:cBhvr>
+                                    </p:animEffect>
+                                  </p:childTnLst>
+                                </p:cTn>
+                              </p:par>
+                            </p:childTnLst>
+                          </p:cTn>
+                        </p:par>
+                      </p:childTnLst>
+                    </p:cTn>
+                  </p:par>
+                  <p:par>
+                    <p:cTn id="8" fill="hold">
+                      <p:stCondLst>
+                        <p:cond delay="indefinite"/>
+                      </p:stCondLst>
+                      <p:childTnLst>
+                        <p:par>
+                          <p:cTn id="9" fill="hold">
+                            <p:stCondLst>
+                              <p:cond delay="0"/>
+                            </p:stCondLst>
+                            <p:childTnLst>
+                              <p:par>
+                                <p:cTn id="10" presetID="9" presetClass="entr" presetSubtype="0" fill="hold" grpId="0" nodeType="clickEffect">
+                                  <p:stCondLst>
+                                    <p:cond delay="0"/>
+                                  </p:stCondLst>
+                                  <p:childTnLst>
+                                    <p:set>
+                                      <p:cBhvr>
+                                        <p:cTn id="11" dur="1" fill="hold">
+                                          <p:stCondLst>
+                                            <p:cond delay="0"/>
+                                          </p:stCondLst>
+                                        </p:cTn>
+                                        <p:tgtEl>
+                                          <p:spTgt spid="2"/>
+                                        </p:tgtEl>
+                                        <p:attrNameLst>
+                                          <p:attrName>style.visibility</p:attrName>
+                                        </p:attrNameLst>
+                                      </p:cBhvr>
+                                      <p:to>
+                                        <p:strVal val="visible"/>
+                                      </p:to>
+                                    </p:set>
+                                    <p:animEffect transition="in" filter="dissolve">
+                                      <p:cBhvr>
+                                        <p:cTn id="12" dur="500"/>
+                                        <p:tgtEl>
+                                          <p:spTgt spid="2"/>
+                                        </p:tgtEl>
+                                      </p:cBhvr>
+                                    </p:animEffect>
+                                  </p:childTnLst>
+                                </p:cTn>
+                              </p:par>
+                            </p:childTnLst>
+                          </p:cTn>
+                        </p:par>
+                      </p:childTnLst>
+                    </p:cTn>
+                  </p:par>
+                </p:childTnLst>
+              </p:cTn>
+              <p:prevCondLst>
+                <p:cond evt="onPrev" delay="0">
+                  <p:tgtEl>
+                    <p:sldTgt/>
+                  </p:tgtEl>
+                </p:cond>
+              </p:prevCondLst>
+              <p:nextCondLst>
+                <p:cond evt="onNext" delay="0">
+                  <p:tgtEl>
+                    <p:sldTgt/>
+                  </p:tgtEl>
+                </p:cond>
+              </p:nextCondLst>
+            </p:seq>
+          </p:childTnLst>
+        </p:cTn>
+      </p:par>
+    </p:tnLst>
+    <p:bldLst>
+      <p:bldP spid="3" grpId="0"/>
+      <p:bldP spid="2" grpId="0"/>
+    </p:bldLst>
+  </p:timing>
+</p:sld>
+</file>
+
+<file path=ppt/slides/slide7.xml><?xml version="1.0" encoding="utf-8"?>
 <p:sld xmlns:a="http://schemas.openxmlformats.org/drawingml/2006/main" xmlns:r="http://schemas.openxmlformats.org/officeDocument/2006/relationships" xmlns:p="http://schemas.openxmlformats.org/presentationml/2006/main">
   <p:cSld>
     <p:bg>
@@ -19258,7 +20495,7 @@
 </p:sld>
 </file>
 
-<file path=ppt/slides/slide7.xml><?xml version="1.0" encoding="utf-8"?>
+<file path=ppt/slides/slide8.xml><?xml version="1.0" encoding="utf-8"?>
 <p:sld xmlns:a="http://schemas.openxmlformats.org/drawingml/2006/main" xmlns:r="http://schemas.openxmlformats.org/officeDocument/2006/relationships" xmlns:p="http://schemas.openxmlformats.org/presentationml/2006/main">
   <p:cSld>
     <p:bg>
@@ -20028,7 +21265,7 @@
 </p:sld>
 </file>
 
-<file path=ppt/slides/slide8.xml><?xml version="1.0" encoding="utf-8"?>
+<file path=ppt/slides/slide9.xml><?xml version="1.0" encoding="utf-8"?>
 <p:sld xmlns:a="http://schemas.openxmlformats.org/drawingml/2006/main" xmlns:r="http://schemas.openxmlformats.org/officeDocument/2006/relationships" xmlns:p="http://schemas.openxmlformats.org/presentationml/2006/main">
   <p:cSld>
     <p:bg>
@@ -20523,761 +21760,6 @@
     <p:extLst>
       <p:ext uri="{BB962C8B-B14F-4D97-AF65-F5344CB8AC3E}">
         <p14:creationId xmlns:p14="http://schemas.microsoft.com/office/powerpoint/2010/main" val="1205899412"/>
-      </p:ext>
-    </p:extLst>
-  </p:cSld>
-  <p:clrMapOvr>
-    <a:masterClrMapping/>
-  </p:clrMapOvr>
-  <p:timing>
-    <p:tnLst>
-      <p:par>
-        <p:cTn id="1" dur="indefinite" restart="never" nodeType="tmRoot">
-          <p:childTnLst>
-            <p:seq concurrent="1" nextAc="seek">
-              <p:cTn id="2" dur="indefinite" nodeType="mainSeq">
-                <p:childTnLst>
-                  <p:par>
-                    <p:cTn id="3" fill="hold">
-                      <p:stCondLst>
-                        <p:cond delay="indefinite"/>
-                      </p:stCondLst>
-                      <p:childTnLst>
-                        <p:par>
-                          <p:cTn id="4" fill="hold">
-                            <p:stCondLst>
-                              <p:cond delay="0"/>
-                            </p:stCondLst>
-                            <p:childTnLst>
-                              <p:par>
-                                <p:cTn id="5" presetID="9" presetClass="entr" presetSubtype="0" fill="hold" grpId="0" nodeType="clickEffect">
-                                  <p:stCondLst>
-                                    <p:cond delay="0"/>
-                                  </p:stCondLst>
-                                  <p:childTnLst>
-                                    <p:set>
-                                      <p:cBhvr>
-                                        <p:cTn id="6" dur="1" fill="hold">
-                                          <p:stCondLst>
-                                            <p:cond delay="0"/>
-                                          </p:stCondLst>
-                                        </p:cTn>
-                                        <p:tgtEl>
-                                          <p:spTgt spid="3"/>
-                                        </p:tgtEl>
-                                        <p:attrNameLst>
-                                          <p:attrName>style.visibility</p:attrName>
-                                        </p:attrNameLst>
-                                      </p:cBhvr>
-                                      <p:to>
-                                        <p:strVal val="visible"/>
-                                      </p:to>
-                                    </p:set>
-                                    <p:animEffect transition="in" filter="dissolve">
-                                      <p:cBhvr>
-                                        <p:cTn id="7" dur="500"/>
-                                        <p:tgtEl>
-                                          <p:spTgt spid="3"/>
-                                        </p:tgtEl>
-                                      </p:cBhvr>
-                                    </p:animEffect>
-                                  </p:childTnLst>
-                                </p:cTn>
-                              </p:par>
-                            </p:childTnLst>
-                          </p:cTn>
-                        </p:par>
-                      </p:childTnLst>
-                    </p:cTn>
-                  </p:par>
-                  <p:par>
-                    <p:cTn id="8" fill="hold">
-                      <p:stCondLst>
-                        <p:cond delay="indefinite"/>
-                      </p:stCondLst>
-                      <p:childTnLst>
-                        <p:par>
-                          <p:cTn id="9" fill="hold">
-                            <p:stCondLst>
-                              <p:cond delay="0"/>
-                            </p:stCondLst>
-                            <p:childTnLst>
-                              <p:par>
-                                <p:cTn id="10" presetID="9" presetClass="entr" presetSubtype="0" fill="hold" grpId="0" nodeType="clickEffect">
-                                  <p:stCondLst>
-                                    <p:cond delay="0"/>
-                                  </p:stCondLst>
-                                  <p:childTnLst>
-                                    <p:set>
-                                      <p:cBhvr>
-                                        <p:cTn id="11" dur="1" fill="hold">
-                                          <p:stCondLst>
-                                            <p:cond delay="0"/>
-                                          </p:stCondLst>
-                                        </p:cTn>
-                                        <p:tgtEl>
-                                          <p:spTgt spid="2"/>
-                                        </p:tgtEl>
-                                        <p:attrNameLst>
-                                          <p:attrName>style.visibility</p:attrName>
-                                        </p:attrNameLst>
-                                      </p:cBhvr>
-                                      <p:to>
-                                        <p:strVal val="visible"/>
-                                      </p:to>
-                                    </p:set>
-                                    <p:animEffect transition="in" filter="dissolve">
-                                      <p:cBhvr>
-                                        <p:cTn id="12" dur="500"/>
-                                        <p:tgtEl>
-                                          <p:spTgt spid="2"/>
-                                        </p:tgtEl>
-                                      </p:cBhvr>
-                                    </p:animEffect>
-                                  </p:childTnLst>
-                                </p:cTn>
-                              </p:par>
-                            </p:childTnLst>
-                          </p:cTn>
-                        </p:par>
-                      </p:childTnLst>
-                    </p:cTn>
-                  </p:par>
-                  <p:par>
-                    <p:cTn id="13" fill="hold">
-                      <p:stCondLst>
-                        <p:cond delay="indefinite"/>
-                      </p:stCondLst>
-                      <p:childTnLst>
-                        <p:par>
-                          <p:cTn id="14" fill="hold">
-                            <p:stCondLst>
-                              <p:cond delay="0"/>
-                            </p:stCondLst>
-                            <p:childTnLst>
-                              <p:par>
-                                <p:cTn id="15" presetID="9" presetClass="entr" presetSubtype="0" fill="hold" grpId="0" nodeType="clickEffect">
-                                  <p:stCondLst>
-                                    <p:cond delay="0"/>
-                                  </p:stCondLst>
-                                  <p:childTnLst>
-                                    <p:set>
-                                      <p:cBhvr>
-                                        <p:cTn id="16" dur="1" fill="hold">
-                                          <p:stCondLst>
-                                            <p:cond delay="0"/>
-                                          </p:stCondLst>
-                                        </p:cTn>
-                                        <p:tgtEl>
-                                          <p:spTgt spid="5"/>
-                                        </p:tgtEl>
-                                        <p:attrNameLst>
-                                          <p:attrName>style.visibility</p:attrName>
-                                        </p:attrNameLst>
-                                      </p:cBhvr>
-                                      <p:to>
-                                        <p:strVal val="visible"/>
-                                      </p:to>
-                                    </p:set>
-                                    <p:animEffect transition="in" filter="dissolve">
-                                      <p:cBhvr>
-                                        <p:cTn id="17" dur="500"/>
-                                        <p:tgtEl>
-                                          <p:spTgt spid="5"/>
-                                        </p:tgtEl>
-                                      </p:cBhvr>
-                                    </p:animEffect>
-                                  </p:childTnLst>
-                                </p:cTn>
-                              </p:par>
-                            </p:childTnLst>
-                          </p:cTn>
-                        </p:par>
-                      </p:childTnLst>
-                    </p:cTn>
-                  </p:par>
-                  <p:par>
-                    <p:cTn id="18" fill="hold">
-                      <p:stCondLst>
-                        <p:cond delay="indefinite"/>
-                      </p:stCondLst>
-                      <p:childTnLst>
-                        <p:par>
-                          <p:cTn id="19" fill="hold">
-                            <p:stCondLst>
-                              <p:cond delay="0"/>
-                            </p:stCondLst>
-                            <p:childTnLst>
-                              <p:par>
-                                <p:cTn id="20" presetID="9" presetClass="entr" presetSubtype="0" fill="hold" nodeType="clickEffect">
-                                  <p:stCondLst>
-                                    <p:cond delay="0"/>
-                                  </p:stCondLst>
-                                  <p:childTnLst>
-                                    <p:set>
-                                      <p:cBhvr>
-                                        <p:cTn id="21" dur="1" fill="hold">
-                                          <p:stCondLst>
-                                            <p:cond delay="0"/>
-                                          </p:stCondLst>
-                                        </p:cTn>
-                                        <p:tgtEl>
-                                          <p:spTgt spid="28"/>
-                                        </p:tgtEl>
-                                        <p:attrNameLst>
-                                          <p:attrName>style.visibility</p:attrName>
-                                        </p:attrNameLst>
-                                      </p:cBhvr>
-                                      <p:to>
-                                        <p:strVal val="visible"/>
-                                      </p:to>
-                                    </p:set>
-                                    <p:animEffect transition="in" filter="dissolve">
-                                      <p:cBhvr>
-                                        <p:cTn id="22" dur="500"/>
-                                        <p:tgtEl>
-                                          <p:spTgt spid="28"/>
-                                        </p:tgtEl>
-                                      </p:cBhvr>
-                                    </p:animEffect>
-                                  </p:childTnLst>
-                                </p:cTn>
-                              </p:par>
-                            </p:childTnLst>
-                          </p:cTn>
-                        </p:par>
-                      </p:childTnLst>
-                    </p:cTn>
-                  </p:par>
-                </p:childTnLst>
-              </p:cTn>
-              <p:prevCondLst>
-                <p:cond evt="onPrev" delay="0">
-                  <p:tgtEl>
-                    <p:sldTgt/>
-                  </p:tgtEl>
-                </p:cond>
-              </p:prevCondLst>
-              <p:nextCondLst>
-                <p:cond evt="onNext" delay="0">
-                  <p:tgtEl>
-                    <p:sldTgt/>
-                  </p:tgtEl>
-                </p:cond>
-              </p:nextCondLst>
-            </p:seq>
-          </p:childTnLst>
-        </p:cTn>
-      </p:par>
-    </p:tnLst>
-    <p:bldLst>
-      <p:bldP spid="3" grpId="0"/>
-      <p:bldP spid="2" grpId="0"/>
-      <p:bldP spid="5" grpId="0"/>
-    </p:bldLst>
-  </p:timing>
-</p:sld>
-</file>
-
-<file path=ppt/slides/slide9.xml><?xml version="1.0" encoding="utf-8"?>
-<p:sld xmlns:a="http://schemas.openxmlformats.org/drawingml/2006/main" xmlns:r="http://schemas.openxmlformats.org/officeDocument/2006/relationships" xmlns:p="http://schemas.openxmlformats.org/presentationml/2006/main">
-  <p:cSld>
-    <p:bg>
-      <p:bgPr>
-        <a:blipFill dpi="0" rotWithShape="1">
-          <a:blip r:embed="rId3">
-            <a:alphaModFix amt="99000"/>
-            <a:lum/>
-          </a:blip>
-          <a:srcRect/>
-          <a:stretch>
-            <a:fillRect t="89000" r="85000" b="-1000"/>
-          </a:stretch>
-        </a:blipFill>
-        <a:effectLst/>
-      </p:bgPr>
-    </p:bg>
-    <p:spTree>
-      <p:nvGrpSpPr>
-        <p:cNvPr id="1" name=""/>
-        <p:cNvGrpSpPr/>
-        <p:nvPr/>
-      </p:nvGrpSpPr>
-      <p:grpSpPr>
-        <a:xfrm>
-          <a:off x="0" y="0"/>
-          <a:ext cx="0" cy="0"/>
-          <a:chOff x="0" y="0"/>
-          <a:chExt cx="0" cy="0"/>
-        </a:xfrm>
-      </p:grpSpPr>
-      <p:sp>
-        <p:nvSpPr>
-          <p:cNvPr id="4" name="Footer Placeholder 3">
-            <a:extLst>
-              <a:ext uri="{FF2B5EF4-FFF2-40B4-BE49-F238E27FC236}">
-                <a16:creationId xmlns:a16="http://schemas.microsoft.com/office/drawing/2014/main" id="{638E7DE1-45EE-476A-A474-0F3C264AEDA3}"/>
-              </a:ext>
-            </a:extLst>
-          </p:cNvPr>
-          <p:cNvSpPr>
-            <a:spLocks noGrp="1"/>
-          </p:cNvSpPr>
-          <p:nvPr>
-            <p:ph type="ftr" sz="quarter" idx="11"/>
-          </p:nvPr>
-        </p:nvSpPr>
-        <p:spPr>
-          <a:xfrm>
-            <a:off x="0" y="6139541"/>
-            <a:ext cx="12192000" cy="718459"/>
-          </a:xfrm>
-          <a:ln w="28575">
-            <a:solidFill>
-              <a:schemeClr val="accent5">
-                <a:lumMod val="50000"/>
-              </a:schemeClr>
-            </a:solidFill>
-          </a:ln>
-        </p:spPr>
-        <p:txBody>
-          <a:bodyPr/>
-          <a:lstStyle/>
-          <a:p>
-            <a:pPr algn="r"/>
-            <a:r>
-              <a:rPr lang="en-US" b="1">
-                <a:solidFill>
-                  <a:schemeClr val="tx1"/>
-                </a:solidFill>
-              </a:rPr>
-              <a:t>CCMACLRL</a:t>
-            </a:r>
-            <a:endParaRPr lang="en-PH" dirty="0"/>
-          </a:p>
-        </p:txBody>
-      </p:sp>
-      <p:sp>
-        <p:nvSpPr>
-          <p:cNvPr id="38" name="Title 1">
-            <a:extLst>
-              <a:ext uri="{FF2B5EF4-FFF2-40B4-BE49-F238E27FC236}">
-                <a16:creationId xmlns:a16="http://schemas.microsoft.com/office/drawing/2014/main" id="{34FAC5F5-ACD5-D061-4054-838F1C03E334}"/>
-              </a:ext>
-            </a:extLst>
-          </p:cNvPr>
-          <p:cNvSpPr>
-            <a:spLocks noGrp="1"/>
-          </p:cNvSpPr>
-          <p:nvPr>
-            <p:ph type="ctrTitle"/>
-          </p:nvPr>
-        </p:nvSpPr>
-        <p:spPr>
-          <a:xfrm>
-            <a:off x="459204" y="378458"/>
-            <a:ext cx="11273589" cy="718459"/>
-          </a:xfrm>
-        </p:spPr>
-        <p:txBody>
-          <a:bodyPr>
-            <a:noAutofit/>
-          </a:bodyPr>
-          <a:lstStyle/>
-          <a:p>
-            <a:r>
-              <a:rPr lang="en-GB" sz="5000" b="1" dirty="0"/>
-              <a:t>Lemmatization</a:t>
-            </a:r>
-            <a:endParaRPr lang="en-PH" sz="5000" b="1" dirty="0"/>
-          </a:p>
-        </p:txBody>
-      </p:sp>
-      <p:sp>
-        <p:nvSpPr>
-          <p:cNvPr id="3" name="TextBox 2">
-            <a:extLst>
-              <a:ext uri="{FF2B5EF4-FFF2-40B4-BE49-F238E27FC236}">
-                <a16:creationId xmlns:a16="http://schemas.microsoft.com/office/drawing/2014/main" id="{2F457E6A-8A4F-6FA8-BC00-1B4BACAA4188}"/>
-              </a:ext>
-            </a:extLst>
-          </p:cNvPr>
-          <p:cNvSpPr txBox="1"/>
-          <p:nvPr/>
-        </p:nvSpPr>
-        <p:spPr>
-          <a:xfrm>
-            <a:off x="872871" y="2572259"/>
-            <a:ext cx="3720395" cy="1126270"/>
-          </a:xfrm>
-          <a:prstGeom prst="rect">
-            <a:avLst/>
-          </a:prstGeom>
-          <a:noFill/>
-        </p:spPr>
-        <p:txBody>
-          <a:bodyPr wrap="square">
-            <a:spAutoFit/>
-          </a:bodyPr>
-          <a:lstStyle/>
-          <a:p>
-            <a:pPr>
-              <a:lnSpc>
-                <a:spcPct val="150000"/>
-              </a:lnSpc>
-            </a:pPr>
-            <a:r>
-              <a:rPr lang="en-PH" sz="5000" dirty="0">
-                <a:latin typeface="Consolas" panose="020B0609020204030204" pitchFamily="49" charset="0"/>
-                <a:cs typeface="Consolas" panose="020B0609020204030204" pitchFamily="49" charset="0"/>
-              </a:rPr>
-              <a:t>Changing</a:t>
-            </a:r>
-          </a:p>
-        </p:txBody>
-      </p:sp>
-      <p:sp>
-        <p:nvSpPr>
-          <p:cNvPr id="6" name="TextBox 5">
-            <a:extLst>
-              <a:ext uri="{FF2B5EF4-FFF2-40B4-BE49-F238E27FC236}">
-                <a16:creationId xmlns:a16="http://schemas.microsoft.com/office/drawing/2014/main" id="{5E5DC7C9-6A45-A3E2-F421-2A25E3B5F5E1}"/>
-              </a:ext>
-            </a:extLst>
-          </p:cNvPr>
-          <p:cNvSpPr txBox="1"/>
-          <p:nvPr/>
-        </p:nvSpPr>
-        <p:spPr>
-          <a:xfrm>
-            <a:off x="459203" y="1368125"/>
-            <a:ext cx="11273589" cy="1246495"/>
-          </a:xfrm>
-          <a:prstGeom prst="rect">
-            <a:avLst/>
-          </a:prstGeom>
-          <a:noFill/>
-        </p:spPr>
-        <p:txBody>
-          <a:bodyPr wrap="square">
-            <a:spAutoFit/>
-          </a:bodyPr>
-          <a:lstStyle/>
-          <a:p>
-            <a:pPr algn="l"/>
-            <a:r>
-              <a:rPr lang="en-PH" sz="2500" dirty="0"/>
-              <a:t>Lemmatization goes beyond simple word reduction and </a:t>
-            </a:r>
-            <a:r>
-              <a:rPr lang="en-PH" sz="2500" b="1" dirty="0">
-                <a:solidFill>
-                  <a:srgbClr val="00B0F0"/>
-                </a:solidFill>
-              </a:rPr>
-              <a:t>considers the context of a word in a sentence.</a:t>
-            </a:r>
-            <a:r>
-              <a:rPr lang="en-PH" sz="2500" dirty="0"/>
-              <a:t> It analyzes the part of speech and meaning to accurately convert words to their base form. A lemma is the base form or dictionary form of a word.</a:t>
-            </a:r>
-          </a:p>
-        </p:txBody>
-      </p:sp>
-      <p:sp>
-        <p:nvSpPr>
-          <p:cNvPr id="2" name="TextBox 1">
-            <a:extLst>
-              <a:ext uri="{FF2B5EF4-FFF2-40B4-BE49-F238E27FC236}">
-                <a16:creationId xmlns:a16="http://schemas.microsoft.com/office/drawing/2014/main" id="{346E2712-BFDB-1C43-290F-35C1EC8FFCA5}"/>
-              </a:ext>
-            </a:extLst>
-          </p:cNvPr>
-          <p:cNvSpPr txBox="1"/>
-          <p:nvPr/>
-        </p:nvSpPr>
-        <p:spPr>
-          <a:xfrm>
-            <a:off x="872871" y="3844239"/>
-            <a:ext cx="3709761" cy="1126270"/>
-          </a:xfrm>
-          <a:prstGeom prst="rect">
-            <a:avLst/>
-          </a:prstGeom>
-          <a:noFill/>
-        </p:spPr>
-        <p:txBody>
-          <a:bodyPr wrap="square">
-            <a:spAutoFit/>
-          </a:bodyPr>
-          <a:lstStyle/>
-          <a:p>
-            <a:pPr>
-              <a:lnSpc>
-                <a:spcPct val="150000"/>
-              </a:lnSpc>
-            </a:pPr>
-            <a:r>
-              <a:rPr lang="en-PH" sz="5000" dirty="0">
-                <a:latin typeface="Consolas" panose="020B0609020204030204" pitchFamily="49" charset="0"/>
-                <a:cs typeface="Consolas" panose="020B0609020204030204" pitchFamily="49" charset="0"/>
-              </a:rPr>
-              <a:t>Changed</a:t>
-            </a:r>
-          </a:p>
-        </p:txBody>
-      </p:sp>
-      <p:sp>
-        <p:nvSpPr>
-          <p:cNvPr id="5" name="TextBox 4">
-            <a:extLst>
-              <a:ext uri="{FF2B5EF4-FFF2-40B4-BE49-F238E27FC236}">
-                <a16:creationId xmlns:a16="http://schemas.microsoft.com/office/drawing/2014/main" id="{926702AB-1B38-0498-E9A7-39EC1F9CFD22}"/>
-              </a:ext>
-            </a:extLst>
-          </p:cNvPr>
-          <p:cNvSpPr txBox="1"/>
-          <p:nvPr/>
-        </p:nvSpPr>
-        <p:spPr>
-          <a:xfrm>
-            <a:off x="883505" y="4927748"/>
-            <a:ext cx="3720395" cy="1126270"/>
-          </a:xfrm>
-          <a:prstGeom prst="rect">
-            <a:avLst/>
-          </a:prstGeom>
-          <a:noFill/>
-        </p:spPr>
-        <p:txBody>
-          <a:bodyPr wrap="square">
-            <a:spAutoFit/>
-          </a:bodyPr>
-          <a:lstStyle/>
-          <a:p>
-            <a:pPr>
-              <a:lnSpc>
-                <a:spcPct val="150000"/>
-              </a:lnSpc>
-            </a:pPr>
-            <a:r>
-              <a:rPr lang="en-PH" sz="5000" dirty="0">
-                <a:latin typeface="Consolas" panose="020B0609020204030204" pitchFamily="49" charset="0"/>
-                <a:cs typeface="Consolas" panose="020B0609020204030204" pitchFamily="49" charset="0"/>
-              </a:rPr>
-              <a:t>Change</a:t>
-            </a:r>
-          </a:p>
-        </p:txBody>
-      </p:sp>
-      <p:grpSp>
-        <p:nvGrpSpPr>
-          <p:cNvPr id="28" name="Group 27">
-            <a:extLst>
-              <a:ext uri="{FF2B5EF4-FFF2-40B4-BE49-F238E27FC236}">
-                <a16:creationId xmlns:a16="http://schemas.microsoft.com/office/drawing/2014/main" id="{4907F9CD-A9AD-CD0B-F24D-3643398C7842}"/>
-              </a:ext>
-            </a:extLst>
-          </p:cNvPr>
-          <p:cNvGrpSpPr/>
-          <p:nvPr/>
-        </p:nvGrpSpPr>
-        <p:grpSpPr>
-          <a:xfrm>
-            <a:off x="4582632" y="3135394"/>
-            <a:ext cx="5752215" cy="2355489"/>
-            <a:chOff x="4582632" y="3135394"/>
-            <a:chExt cx="5752215" cy="2355489"/>
-          </a:xfrm>
-        </p:grpSpPr>
-        <p:sp>
-          <p:nvSpPr>
-            <p:cNvPr id="7" name="TextBox 6">
-              <a:extLst>
-                <a:ext uri="{FF2B5EF4-FFF2-40B4-BE49-F238E27FC236}">
-                  <a16:creationId xmlns:a16="http://schemas.microsoft.com/office/drawing/2014/main" id="{8C20B39E-9926-6A0A-A903-B11D76E8CCF5}"/>
-                </a:ext>
-              </a:extLst>
-            </p:cNvPr>
-            <p:cNvSpPr txBox="1"/>
-            <p:nvPr/>
-          </p:nvSpPr>
-          <p:spPr>
-            <a:xfrm>
-              <a:off x="7309113" y="3844239"/>
-              <a:ext cx="3025734" cy="1126270"/>
-            </a:xfrm>
-            <a:prstGeom prst="rect">
-              <a:avLst/>
-            </a:prstGeom>
-            <a:noFill/>
-          </p:spPr>
-          <p:txBody>
-            <a:bodyPr wrap="square">
-              <a:spAutoFit/>
-            </a:bodyPr>
-            <a:lstStyle/>
-            <a:p>
-              <a:pPr>
-                <a:lnSpc>
-                  <a:spcPct val="150000"/>
-                </a:lnSpc>
-              </a:pPr>
-              <a:r>
-                <a:rPr lang="en-PH" sz="5000" b="1" dirty="0">
-                  <a:solidFill>
-                    <a:srgbClr val="00B050"/>
-                  </a:solidFill>
-                  <a:latin typeface="Consolas" panose="020B0609020204030204" pitchFamily="49" charset="0"/>
-                  <a:cs typeface="Consolas" panose="020B0609020204030204" pitchFamily="49" charset="0"/>
-                </a:rPr>
-                <a:t>Change</a:t>
-              </a:r>
-            </a:p>
-          </p:txBody>
-        </p:sp>
-        <p:cxnSp>
-          <p:nvCxnSpPr>
-            <p:cNvPr id="9" name="Straight Arrow Connector 8">
-              <a:extLst>
-                <a:ext uri="{FF2B5EF4-FFF2-40B4-BE49-F238E27FC236}">
-                  <a16:creationId xmlns:a16="http://schemas.microsoft.com/office/drawing/2014/main" id="{B6DA4648-B70E-2827-7322-70D3DF5D98DC}"/>
-                </a:ext>
-              </a:extLst>
-            </p:cNvPr>
-            <p:cNvCxnSpPr>
-              <a:stCxn id="3" idx="3"/>
-              <a:endCxn id="7" idx="1"/>
-            </p:cNvCxnSpPr>
-            <p:nvPr/>
-          </p:nvCxnSpPr>
-          <p:spPr>
-            <a:xfrm>
-              <a:off x="4593266" y="3135394"/>
-              <a:ext cx="2715847" cy="1271980"/>
-            </a:xfrm>
-            <a:prstGeom prst="straightConnector1">
-              <a:avLst/>
-            </a:prstGeom>
-            <a:ln w="76200">
-              <a:solidFill>
-                <a:schemeClr val="tx1"/>
-              </a:solidFill>
-              <a:tailEnd type="triangle"/>
-            </a:ln>
-          </p:spPr>
-          <p:style>
-            <a:lnRef idx="1">
-              <a:schemeClr val="accent1"/>
-            </a:lnRef>
-            <a:fillRef idx="0">
-              <a:schemeClr val="accent1"/>
-            </a:fillRef>
-            <a:effectRef idx="0">
-              <a:schemeClr val="accent1"/>
-            </a:effectRef>
-            <a:fontRef idx="minor">
-              <a:schemeClr val="tx1"/>
-            </a:fontRef>
-          </p:style>
-        </p:cxnSp>
-        <p:cxnSp>
-          <p:nvCxnSpPr>
-            <p:cNvPr id="10" name="Straight Arrow Connector 9">
-              <a:extLst>
-                <a:ext uri="{FF2B5EF4-FFF2-40B4-BE49-F238E27FC236}">
-                  <a16:creationId xmlns:a16="http://schemas.microsoft.com/office/drawing/2014/main" id="{AF5CD6C1-6D06-A8DC-C0DB-45A031593D4C}"/>
-                </a:ext>
-              </a:extLst>
-            </p:cNvPr>
-            <p:cNvCxnSpPr>
-              <a:cxnSpLocks/>
-              <a:stCxn id="5" idx="3"/>
-              <a:endCxn id="7" idx="1"/>
-            </p:cNvCxnSpPr>
-            <p:nvPr/>
-          </p:nvCxnSpPr>
-          <p:spPr>
-            <a:xfrm flipV="1">
-              <a:off x="4603900" y="4407374"/>
-              <a:ext cx="2705213" cy="1083509"/>
-            </a:xfrm>
-            <a:prstGeom prst="straightConnector1">
-              <a:avLst/>
-            </a:prstGeom>
-            <a:ln w="76200">
-              <a:solidFill>
-                <a:schemeClr val="tx1"/>
-              </a:solidFill>
-              <a:tailEnd type="triangle"/>
-            </a:ln>
-          </p:spPr>
-          <p:style>
-            <a:lnRef idx="1">
-              <a:schemeClr val="accent1"/>
-            </a:lnRef>
-            <a:fillRef idx="0">
-              <a:schemeClr val="accent1"/>
-            </a:fillRef>
-            <a:effectRef idx="0">
-              <a:schemeClr val="accent1"/>
-            </a:effectRef>
-            <a:fontRef idx="minor">
-              <a:schemeClr val="tx1"/>
-            </a:fontRef>
-          </p:style>
-        </p:cxnSp>
-        <p:cxnSp>
-          <p:nvCxnSpPr>
-            <p:cNvPr id="13" name="Straight Arrow Connector 12">
-              <a:extLst>
-                <a:ext uri="{FF2B5EF4-FFF2-40B4-BE49-F238E27FC236}">
-                  <a16:creationId xmlns:a16="http://schemas.microsoft.com/office/drawing/2014/main" id="{4A34A73D-E020-D727-ED58-E4820F424FC9}"/>
-                </a:ext>
-              </a:extLst>
-            </p:cNvPr>
-            <p:cNvCxnSpPr>
-              <a:cxnSpLocks/>
-              <a:stCxn id="2" idx="3"/>
-              <a:endCxn id="7" idx="1"/>
-            </p:cNvCxnSpPr>
-            <p:nvPr/>
-          </p:nvCxnSpPr>
-          <p:spPr>
-            <a:xfrm>
-              <a:off x="4582632" y="4407374"/>
-              <a:ext cx="2726481" cy="0"/>
-            </a:xfrm>
-            <a:prstGeom prst="straightConnector1">
-              <a:avLst/>
-            </a:prstGeom>
-            <a:ln w="76200">
-              <a:solidFill>
-                <a:schemeClr val="tx1"/>
-              </a:solidFill>
-              <a:tailEnd type="triangle"/>
-            </a:ln>
-          </p:spPr>
-          <p:style>
-            <a:lnRef idx="1">
-              <a:schemeClr val="accent1"/>
-            </a:lnRef>
-            <a:fillRef idx="0">
-              <a:schemeClr val="accent1"/>
-            </a:fillRef>
-            <a:effectRef idx="0">
-              <a:schemeClr val="accent1"/>
-            </a:effectRef>
-            <a:fontRef idx="minor">
-              <a:schemeClr val="tx1"/>
-            </a:fontRef>
-          </p:style>
-        </p:cxnSp>
-      </p:grpSp>
-    </p:spTree>
-    <p:extLst>
-      <p:ext uri="{BB962C8B-B14F-4D97-AF65-F5344CB8AC3E}">
-        <p14:creationId xmlns:p14="http://schemas.microsoft.com/office/powerpoint/2010/main" val="1855864219"/>
       </p:ext>
     </p:extLst>
   </p:cSld>
@@ -22131,6 +22613,15 @@
 </file>
 
 <file path=customXml/item2.xml><?xml version="1.0" encoding="utf-8"?>
+<?mso-contentType ?>
+<FormTemplates xmlns="http://schemas.microsoft.com/sharepoint/v3/contenttype/forms">
+  <Display>DocumentLibraryForm</Display>
+  <Edit>DocumentLibraryForm</Edit>
+  <New>DocumentLibraryForm</New>
+</FormTemplates>
+</file>
+
+<file path=customXml/item3.xml><?xml version="1.0" encoding="utf-8"?>
 <ct:contentTypeSchema xmlns:ct="http://schemas.microsoft.com/office/2006/metadata/contentType" xmlns:ma="http://schemas.microsoft.com/office/2006/metadata/properties/metaAttributes" ct:_="" ma:_="" ma:contentTypeName="Document" ma:contentTypeID="0x0101007188BDCA587B344BBA6CB1A93FAE6998" ma:contentTypeVersion="2" ma:contentTypeDescription="Create a new document." ma:contentTypeScope="" ma:versionID="7a8e4b6720badb2566a0cfeddfaf2856">
   <xsd:schema xmlns:xsd="http://www.w3.org/2001/XMLSchema" xmlns:xs="http://www.w3.org/2001/XMLSchema" xmlns:p="http://schemas.microsoft.com/office/2006/metadata/properties" xmlns:ns2="ba111d12-426d-4af0-bcb6-460e36974645" targetNamespace="http://schemas.microsoft.com/office/2006/metadata/properties" ma:root="true" ma:fieldsID="989b05398519136c88ba0a8d54e3c3da" ns2:_="">
     <xsd:import namespace="ba111d12-426d-4af0-bcb6-460e36974645"/>
@@ -22262,15 +22753,6 @@
 </ct:contentTypeSchema>
 </file>
 
-<file path=customXml/item3.xml><?xml version="1.0" encoding="utf-8"?>
-<?mso-contentType ?>
-<FormTemplates xmlns="http://schemas.microsoft.com/sharepoint/v3/contenttype/forms">
-  <Display>DocumentLibraryForm</Display>
-  <Edit>DocumentLibraryForm</Edit>
-  <New>DocumentLibraryForm</New>
-</FormTemplates>
-</file>
-
 <file path=customXml/itemProps1.xml><?xml version="1.0" encoding="utf-8"?>
 <ds:datastoreItem xmlns:ds="http://schemas.openxmlformats.org/officeDocument/2006/customXml" ds:itemID="{7ACF14CA-9E7F-410C-99DF-E0FAFDE78C11}">
   <ds:schemaRefs>
@@ -22281,6 +22763,14 @@
 </file>
 
 <file path=customXml/itemProps2.xml><?xml version="1.0" encoding="utf-8"?>
+<ds:datastoreItem xmlns:ds="http://schemas.openxmlformats.org/officeDocument/2006/customXml" ds:itemID="{6C1A3F1B-CE3A-47AB-9F84-47E786467973}">
+  <ds:schemaRefs>
+    <ds:schemaRef ds:uri="http://schemas.microsoft.com/sharepoint/v3/contenttype/forms"/>
+  </ds:schemaRefs>
+</ds:datastoreItem>
+</file>
+
+<file path=customXml/itemProps3.xml><?xml version="1.0" encoding="utf-8"?>
 <ds:datastoreItem xmlns:ds="http://schemas.openxmlformats.org/officeDocument/2006/customXml" ds:itemID="{D622FF19-6ECD-4B79-A412-9430824D2BB6}">
   <ds:schemaRefs>
     <ds:schemaRef ds:uri="http://schemas.microsoft.com/office/2006/metadata/contentType"/>
@@ -22296,12 +22786,4 @@
     <ds:schemaRef ds:uri="http://schemas.microsoft.com/internal/obd"/>
   </ds:schemaRefs>
 </ds:datastoreItem>
-</file>
-
-<file path=customXml/itemProps3.xml><?xml version="1.0" encoding="utf-8"?>
-<ds:datastoreItem xmlns:ds="http://schemas.openxmlformats.org/officeDocument/2006/customXml" ds:itemID="{6C1A3F1B-CE3A-47AB-9F84-47E786467973}">
-  <ds:schemaRefs>
-    <ds:schemaRef ds:uri="http://schemas.microsoft.com/sharepoint/v3/contenttype/forms"/>
-  </ds:schemaRefs>
-</ds:datastoreItem>
 </file>
</xml_diff>